<commit_message>
Add landing page with Grid Motion animation and email capture functionality
</commit_message>
<xml_diff>
--- a/template_library/available/Cyan Flow Template.pptx
+++ b/template_library/available/Cyan Flow Template.pptx
@@ -5,7 +5,7 @@
     <p:sldMasterId id="2147483648" r:id="rId1"/>
   </p:sldMasterIdLst>
   <p:sldIdLst>
-    <p:sldId id="256" r:id="rId2"/>
+    <p:sldId id="258" r:id="rId2"/>
   </p:sldIdLst>
   <p:sldSz cx="30276800" cy="42799000"/>
   <p:notesSz cx="7104063" cy="10234613"/>
@@ -140,7 +140,7 @@
 <file path=ppt/revisionInfo.xml><?xml version="1.0" encoding="utf-8"?>
 <p1510:revInfo xmlns:a="http://schemas.openxmlformats.org/drawingml/2006/main" xmlns:r="http://schemas.openxmlformats.org/officeDocument/2006/relationships" xmlns:p1510="http://schemas.microsoft.com/office/powerpoint/2015/10/main">
   <p1510:revLst>
-    <p1510:client id="{CEC091DF-2F55-496A-BC20-BFDA95465D8E}" v="1" dt="2025-07-23T12:42:03.831"/>
+    <p1510:client id="{CEC091DF-2F55-496A-BC20-BFDA95465D8E}" v="33" dt="2025-07-24T13:00:40.264"/>
   </p1510:revLst>
 </p1510:revInfo>
 </file>
@@ -149,19 +149,43 @@
 <pc:chgInfo xmlns:a="http://schemas.openxmlformats.org/drawingml/2006/main" xmlns:r="http://schemas.openxmlformats.org/officeDocument/2006/relationships" xmlns:ac="http://schemas.microsoft.com/office/drawing/2013/main/command" xmlns:pc="http://schemas.microsoft.com/office/powerpoint/2013/main/command">
   <pc:docChgLst>
     <pc:chgData name="Nathan Skidmore" userId="a2f2a0bbf2c25333" providerId="LiveId" clId="{CEC091DF-2F55-496A-BC20-BFDA95465D8E}"/>
-    <pc:docChg chg="undo custSel modSld">
-      <pc:chgData name="Nathan Skidmore" userId="a2f2a0bbf2c25333" providerId="LiveId" clId="{CEC091DF-2F55-496A-BC20-BFDA95465D8E}" dt="2025-07-23T12:42:24.300" v="12" actId="2711"/>
+    <pc:docChg chg="undo custSel addSld delSld modSld modMainMaster">
+      <pc:chgData name="Nathan Skidmore" userId="a2f2a0bbf2c25333" providerId="LiveId" clId="{CEC091DF-2F55-496A-BC20-BFDA95465D8E}" dt="2025-07-24T13:26:45.647" v="159" actId="14100"/>
       <pc:docMkLst>
         <pc:docMk/>
       </pc:docMkLst>
-      <pc:sldChg chg="modSp mod">
-        <pc:chgData name="Nathan Skidmore" userId="a2f2a0bbf2c25333" providerId="LiveId" clId="{CEC091DF-2F55-496A-BC20-BFDA95465D8E}" dt="2025-07-23T12:42:24.300" v="12" actId="2711"/>
+      <pc:sldChg chg="addSp delSp modSp del mod">
+        <pc:chgData name="Nathan Skidmore" userId="a2f2a0bbf2c25333" providerId="LiveId" clId="{CEC091DF-2F55-496A-BC20-BFDA95465D8E}" dt="2025-07-24T12:37:16.913" v="56" actId="47"/>
         <pc:sldMkLst>
           <pc:docMk/>
           <pc:sldMk cId="0" sldId="256"/>
         </pc:sldMkLst>
         <pc:spChg chg="mod">
-          <ac:chgData name="Nathan Skidmore" userId="a2f2a0bbf2c25333" providerId="LiveId" clId="{CEC091DF-2F55-496A-BC20-BFDA95465D8E}" dt="2025-07-23T12:42:13.416" v="10" actId="2711"/>
+          <ac:chgData name="Nathan Skidmore" userId="a2f2a0bbf2c25333" providerId="LiveId" clId="{CEC091DF-2F55-496A-BC20-BFDA95465D8E}" dt="2025-07-24T12:33:36.282" v="13" actId="962"/>
+          <ac:spMkLst>
+            <pc:docMk/>
+            <pc:sldMk cId="0" sldId="256"/>
+            <ac:spMk id="15" creationId="{00000000-0000-0000-0000-000000000000}"/>
+          </ac:spMkLst>
+        </pc:spChg>
+        <pc:spChg chg="mod">
+          <ac:chgData name="Nathan Skidmore" userId="a2f2a0bbf2c25333" providerId="LiveId" clId="{CEC091DF-2F55-496A-BC20-BFDA95465D8E}" dt="2025-07-24T12:33:43.803" v="14" actId="962"/>
+          <ac:spMkLst>
+            <pc:docMk/>
+            <pc:sldMk cId="0" sldId="256"/>
+            <ac:spMk id="16" creationId="{00000000-0000-0000-0000-000000000000}"/>
+          </ac:spMkLst>
+        </pc:spChg>
+        <pc:spChg chg="mod">
+          <ac:chgData name="Nathan Skidmore" userId="a2f2a0bbf2c25333" providerId="LiveId" clId="{CEC091DF-2F55-496A-BC20-BFDA95465D8E}" dt="2025-07-24T12:33:50.506" v="15" actId="962"/>
+          <ac:spMkLst>
+            <pc:docMk/>
+            <pc:sldMk cId="0" sldId="256"/>
+            <ac:spMk id="17" creationId="{00000000-0000-0000-0000-000000000000}"/>
+          </ac:spMkLst>
+        </pc:spChg>
+        <pc:spChg chg="mod">
+          <ac:chgData name="Nathan Skidmore" userId="a2f2a0bbf2c25333" providerId="LiveId" clId="{CEC091DF-2F55-496A-BC20-BFDA95465D8E}" dt="2025-07-24T12:33:59.225" v="16" actId="962"/>
           <ac:spMkLst>
             <pc:docMk/>
             <pc:sldMk cId="0" sldId="256"/>
@@ -169,7 +193,7 @@
           </ac:spMkLst>
         </pc:spChg>
         <pc:spChg chg="mod">
-          <ac:chgData name="Nathan Skidmore" userId="a2f2a0bbf2c25333" providerId="LiveId" clId="{CEC091DF-2F55-496A-BC20-BFDA95465D8E}" dt="2025-07-23T12:42:19.813" v="11" actId="2711"/>
+          <ac:chgData name="Nathan Skidmore" userId="a2f2a0bbf2c25333" providerId="LiveId" clId="{CEC091DF-2F55-496A-BC20-BFDA95465D8E}" dt="2025-07-24T12:34:14.151" v="18" actId="962"/>
           <ac:spMkLst>
             <pc:docMk/>
             <pc:sldMk cId="0" sldId="256"/>
@@ -177,7 +201,7 @@
           </ac:spMkLst>
         </pc:spChg>
         <pc:spChg chg="mod">
-          <ac:chgData name="Nathan Skidmore" userId="a2f2a0bbf2c25333" providerId="LiveId" clId="{CEC091DF-2F55-496A-BC20-BFDA95465D8E}" dt="2025-07-23T12:42:19.813" v="11" actId="2711"/>
+          <ac:chgData name="Nathan Skidmore" userId="a2f2a0bbf2c25333" providerId="LiveId" clId="{CEC091DF-2F55-496A-BC20-BFDA95465D8E}" dt="2025-07-24T12:34:05.719" v="17" actId="962"/>
           <ac:spMkLst>
             <pc:docMk/>
             <pc:sldMk cId="0" sldId="256"/>
@@ -185,7 +209,15 @@
           </ac:spMkLst>
         </pc:spChg>
         <pc:spChg chg="mod">
-          <ac:chgData name="Nathan Skidmore" userId="a2f2a0bbf2c25333" providerId="LiveId" clId="{CEC091DF-2F55-496A-BC20-BFDA95465D8E}" dt="2025-07-23T12:42:19.813" v="11" actId="2711"/>
+          <ac:chgData name="Nathan Skidmore" userId="a2f2a0bbf2c25333" providerId="LiveId" clId="{CEC091DF-2F55-496A-BC20-BFDA95465D8E}" dt="2025-07-24T12:35:14.550" v="33" actId="20577"/>
+          <ac:spMkLst>
+            <pc:docMk/>
+            <pc:sldMk cId="0" sldId="256"/>
+            <ac:spMk id="26" creationId="{00000000-0000-0000-0000-000000000000}"/>
+          </ac:spMkLst>
+        </pc:spChg>
+        <pc:spChg chg="del mod">
+          <ac:chgData name="Nathan Skidmore" userId="a2f2a0bbf2c25333" providerId="LiveId" clId="{CEC091DF-2F55-496A-BC20-BFDA95465D8E}" dt="2025-07-24T12:34:41.792" v="22"/>
           <ac:spMkLst>
             <pc:docMk/>
             <pc:sldMk cId="0" sldId="256"/>
@@ -193,7 +225,7 @@
           </ac:spMkLst>
         </pc:spChg>
         <pc:spChg chg="mod">
-          <ac:chgData name="Nathan Skidmore" userId="a2f2a0bbf2c25333" providerId="LiveId" clId="{CEC091DF-2F55-496A-BC20-BFDA95465D8E}" dt="2025-07-23T12:42:24.300" v="12" actId="2711"/>
+          <ac:chgData name="Nathan Skidmore" userId="a2f2a0bbf2c25333" providerId="LiveId" clId="{CEC091DF-2F55-496A-BC20-BFDA95465D8E}" dt="2025-07-24T12:34:25" v="19" actId="962"/>
           <ac:spMkLst>
             <pc:docMk/>
             <pc:sldMk cId="0" sldId="256"/>
@@ -201,11 +233,27 @@
           </ac:spMkLst>
         </pc:spChg>
         <pc:spChg chg="mod">
-          <ac:chgData name="Nathan Skidmore" userId="a2f2a0bbf2c25333" providerId="LiveId" clId="{CEC091DF-2F55-496A-BC20-BFDA95465D8E}" dt="2025-07-23T12:42:24.300" v="12" actId="2711"/>
+          <ac:chgData name="Nathan Skidmore" userId="a2f2a0bbf2c25333" providerId="LiveId" clId="{CEC091DF-2F55-496A-BC20-BFDA95465D8E}" dt="2025-07-24T12:36:03.015" v="45" actId="962"/>
           <ac:spMkLst>
             <pc:docMk/>
             <pc:sldMk cId="0" sldId="256"/>
             <ac:spMk id="33" creationId="{00000000-0000-0000-0000-000000000000}"/>
+          </ac:spMkLst>
+        </pc:spChg>
+        <pc:spChg chg="add del mod">
+          <ac:chgData name="Nathan Skidmore" userId="a2f2a0bbf2c25333" providerId="LiveId" clId="{CEC091DF-2F55-496A-BC20-BFDA95465D8E}" dt="2025-07-24T12:35:46.153" v="41" actId="478"/>
+          <ac:spMkLst>
+            <pc:docMk/>
+            <pc:sldMk cId="0" sldId="256"/>
+            <ac:spMk id="34" creationId="{600E64DA-7F66-B3D4-55F2-4D7A75188180}"/>
+          </ac:spMkLst>
+        </pc:spChg>
+        <pc:spChg chg="add del mod">
+          <ac:chgData name="Nathan Skidmore" userId="a2f2a0bbf2c25333" providerId="LiveId" clId="{CEC091DF-2F55-496A-BC20-BFDA95465D8E}" dt="2025-07-24T12:35:58.236" v="44" actId="478"/>
+          <ac:spMkLst>
+            <pc:docMk/>
+            <pc:sldMk cId="0" sldId="256"/>
+            <ac:spMk id="36" creationId="{9CF6F8F7-7A3B-3760-CBDA-5869560923B8}"/>
           </ac:spMkLst>
         </pc:spChg>
         <pc:grpChg chg="mod">
@@ -216,14 +264,566 @@
             <ac:grpSpMk id="2" creationId="{00000000-0000-0000-0000-000000000000}"/>
           </ac:grpSpMkLst>
         </pc:grpChg>
+        <pc:grpChg chg="mod">
+          <ac:chgData name="Nathan Skidmore" userId="a2f2a0bbf2c25333" providerId="LiveId" clId="{CEC091DF-2F55-496A-BC20-BFDA95465D8E}" dt="2025-07-24T12:34:49.009" v="23" actId="1076"/>
+          <ac:grpSpMkLst>
+            <pc:docMk/>
+            <pc:sldMk cId="0" sldId="256"/>
+            <ac:grpSpMk id="6" creationId="{00000000-0000-0000-0000-000000000000}"/>
+          </ac:grpSpMkLst>
+        </pc:grpChg>
       </pc:sldChg>
+      <pc:sldChg chg="addSp delSp modSp new del mod">
+        <pc:chgData name="Nathan Skidmore" userId="a2f2a0bbf2c25333" providerId="LiveId" clId="{CEC091DF-2F55-496A-BC20-BFDA95465D8E}" dt="2025-07-24T13:01:10.820" v="149" actId="47"/>
+        <pc:sldMkLst>
+          <pc:docMk/>
+          <pc:sldMk cId="209001808" sldId="257"/>
+        </pc:sldMkLst>
+        <pc:spChg chg="del">
+          <ac:chgData name="Nathan Skidmore" userId="a2f2a0bbf2c25333" providerId="LiveId" clId="{CEC091DF-2F55-496A-BC20-BFDA95465D8E}" dt="2025-07-24T12:37:05.098" v="54" actId="478"/>
+          <ac:spMkLst>
+            <pc:docMk/>
+            <pc:sldMk cId="209001808" sldId="257"/>
+            <ac:spMk id="2" creationId="{810E30B5-52FE-5AD2-0E7F-0FB368608E97}"/>
+          </ac:spMkLst>
+        </pc:spChg>
+        <pc:spChg chg="del">
+          <ac:chgData name="Nathan Skidmore" userId="a2f2a0bbf2c25333" providerId="LiveId" clId="{CEC091DF-2F55-496A-BC20-BFDA95465D8E}" dt="2025-07-24T12:37:06.951" v="55" actId="478"/>
+          <ac:spMkLst>
+            <pc:docMk/>
+            <pc:sldMk cId="209001808" sldId="257"/>
+            <ac:spMk id="3" creationId="{5C9B96E8-B59A-B02C-0A10-F1DBADA24F16}"/>
+          </ac:spMkLst>
+        </pc:spChg>
+        <pc:spChg chg="mod">
+          <ac:chgData name="Nathan Skidmore" userId="a2f2a0bbf2c25333" providerId="LiveId" clId="{CEC091DF-2F55-496A-BC20-BFDA95465D8E}" dt="2025-07-24T12:56:20.662" v="95"/>
+          <ac:spMkLst>
+            <pc:docMk/>
+            <pc:sldMk cId="209001808" sldId="257"/>
+            <ac:spMk id="3" creationId="{6B979C65-1593-5255-D9B9-C781412753FF}"/>
+          </ac:spMkLst>
+        </pc:spChg>
+        <pc:spChg chg="mod ord">
+          <ac:chgData name="Nathan Skidmore" userId="a2f2a0bbf2c25333" providerId="LiveId" clId="{CEC091DF-2F55-496A-BC20-BFDA95465D8E}" dt="2025-07-24T12:59:14.853" v="133" actId="962"/>
+          <ac:spMkLst>
+            <pc:docMk/>
+            <pc:sldMk cId="209001808" sldId="257"/>
+            <ac:spMk id="4" creationId="{49C3B7D1-DF4E-4242-FC23-DB508C5CBDDC}"/>
+          </ac:spMkLst>
+        </pc:spChg>
+        <pc:spChg chg="mod">
+          <ac:chgData name="Nathan Skidmore" userId="a2f2a0bbf2c25333" providerId="LiveId" clId="{CEC091DF-2F55-496A-BC20-BFDA95465D8E}" dt="2025-07-24T12:36:41.618" v="50"/>
+          <ac:spMkLst>
+            <pc:docMk/>
+            <pc:sldMk cId="209001808" sldId="257"/>
+            <ac:spMk id="6" creationId="{3BFD033F-B93D-B264-E9E6-5B9FCCFEFBDA}"/>
+          </ac:spMkLst>
+        </pc:spChg>
+        <pc:spChg chg="add mod">
+          <ac:chgData name="Nathan Skidmore" userId="a2f2a0bbf2c25333" providerId="LiveId" clId="{CEC091DF-2F55-496A-BC20-BFDA95465D8E}" dt="2025-07-24T12:36:41.618" v="50"/>
+          <ac:spMkLst>
+            <pc:docMk/>
+            <pc:sldMk cId="209001808" sldId="257"/>
+            <ac:spMk id="8" creationId="{E56D0C48-2E35-6280-E371-9B8EC276ED38}"/>
+          </ac:spMkLst>
+        </pc:spChg>
+        <pc:spChg chg="mod">
+          <ac:chgData name="Nathan Skidmore" userId="a2f2a0bbf2c25333" providerId="LiveId" clId="{CEC091DF-2F55-496A-BC20-BFDA95465D8E}" dt="2025-07-24T12:36:41.618" v="50"/>
+          <ac:spMkLst>
+            <pc:docMk/>
+            <pc:sldMk cId="209001808" sldId="257"/>
+            <ac:spMk id="11" creationId="{6F5C1EE2-A659-7098-222A-1B1A4E824435}"/>
+          </ac:spMkLst>
+        </pc:spChg>
+        <pc:spChg chg="add mod">
+          <ac:chgData name="Nathan Skidmore" userId="a2f2a0bbf2c25333" providerId="LiveId" clId="{CEC091DF-2F55-496A-BC20-BFDA95465D8E}" dt="2025-07-24T12:36:41.618" v="50"/>
+          <ac:spMkLst>
+            <pc:docMk/>
+            <pc:sldMk cId="209001808" sldId="257"/>
+            <ac:spMk id="12" creationId="{8F42F8C6-4914-5B7E-84FB-EEC5853E404C}"/>
+          </ac:spMkLst>
+        </pc:spChg>
+        <pc:spChg chg="add mod">
+          <ac:chgData name="Nathan Skidmore" userId="a2f2a0bbf2c25333" providerId="LiveId" clId="{CEC091DF-2F55-496A-BC20-BFDA95465D8E}" dt="2025-07-24T12:36:41.618" v="50"/>
+          <ac:spMkLst>
+            <pc:docMk/>
+            <pc:sldMk cId="209001808" sldId="257"/>
+            <ac:spMk id="14" creationId="{EEC13606-B140-3FE0-6554-826FE044BC3A}"/>
+          </ac:spMkLst>
+        </pc:spChg>
+        <pc:spChg chg="add mod">
+          <ac:chgData name="Nathan Skidmore" userId="a2f2a0bbf2c25333" providerId="LiveId" clId="{CEC091DF-2F55-496A-BC20-BFDA95465D8E}" dt="2025-07-24T12:57:21.170" v="108" actId="1076"/>
+          <ac:spMkLst>
+            <pc:docMk/>
+            <pc:sldMk cId="209001808" sldId="257"/>
+            <ac:spMk id="15" creationId="{565F6F1D-4385-92CA-FBF7-CC1C79CDF458}"/>
+          </ac:spMkLst>
+        </pc:spChg>
+        <pc:spChg chg="mod">
+          <ac:chgData name="Nathan Skidmore" userId="a2f2a0bbf2c25333" providerId="LiveId" clId="{CEC091DF-2F55-496A-BC20-BFDA95465D8E}" dt="2025-07-24T12:52:46.494" v="78" actId="1076"/>
+          <ac:spMkLst>
+            <pc:docMk/>
+            <pc:sldMk cId="209001808" sldId="257"/>
+            <ac:spMk id="16" creationId="{6B399206-3D3D-BC5C-B45C-B1B1E0224C21}"/>
+          </ac:spMkLst>
+        </pc:spChg>
+        <pc:spChg chg="mod">
+          <ac:chgData name="Nathan Skidmore" userId="a2f2a0bbf2c25333" providerId="LiveId" clId="{CEC091DF-2F55-496A-BC20-BFDA95465D8E}" dt="2025-07-24T12:53:00.556" v="81" actId="1076"/>
+          <ac:spMkLst>
+            <pc:docMk/>
+            <pc:sldMk cId="209001808" sldId="257"/>
+            <ac:spMk id="17" creationId="{E6AEA534-0372-0D12-5688-705EE2B878A0}"/>
+          </ac:spMkLst>
+        </pc:spChg>
+        <pc:spChg chg="mod">
+          <ac:chgData name="Nathan Skidmore" userId="a2f2a0bbf2c25333" providerId="LiveId" clId="{CEC091DF-2F55-496A-BC20-BFDA95465D8E}" dt="2025-07-24T12:41:29.372" v="73" actId="207"/>
+          <ac:spMkLst>
+            <pc:docMk/>
+            <pc:sldMk cId="209001808" sldId="257"/>
+            <ac:spMk id="18" creationId="{4DB5F174-6F6F-9A94-4661-7D9C08170CAA}"/>
+          </ac:spMkLst>
+        </pc:spChg>
+        <pc:spChg chg="add mod">
+          <ac:chgData name="Nathan Skidmore" userId="a2f2a0bbf2c25333" providerId="LiveId" clId="{CEC091DF-2F55-496A-BC20-BFDA95465D8E}" dt="2025-07-24T12:53:27.380" v="82" actId="1076"/>
+          <ac:spMkLst>
+            <pc:docMk/>
+            <pc:sldMk cId="209001808" sldId="257"/>
+            <ac:spMk id="19" creationId="{293528CF-769A-2693-17A1-80125E3ED715}"/>
+          </ac:spMkLst>
+        </pc:spChg>
+        <pc:spChg chg="mod">
+          <ac:chgData name="Nathan Skidmore" userId="a2f2a0bbf2c25333" providerId="LiveId" clId="{CEC091DF-2F55-496A-BC20-BFDA95465D8E}" dt="2025-07-24T12:53:35.884" v="83" actId="1076"/>
+          <ac:spMkLst>
+            <pc:docMk/>
+            <pc:sldMk cId="209001808" sldId="257"/>
+            <ac:spMk id="20" creationId="{3A826F50-F409-4B25-B986-FB55B29FBA83}"/>
+          </ac:spMkLst>
+        </pc:spChg>
+        <pc:spChg chg="mod">
+          <ac:chgData name="Nathan Skidmore" userId="a2f2a0bbf2c25333" providerId="LiveId" clId="{CEC091DF-2F55-496A-BC20-BFDA95465D8E}" dt="2025-07-24T12:57:21.170" v="108" actId="1076"/>
+          <ac:spMkLst>
+            <pc:docMk/>
+            <pc:sldMk cId="209001808" sldId="257"/>
+            <ac:spMk id="24" creationId="{BD4D952D-A8C5-2113-68B3-1889A131D0BC}"/>
+          </ac:spMkLst>
+        </pc:spChg>
+        <pc:spChg chg="mod">
+          <ac:chgData name="Nathan Skidmore" userId="a2f2a0bbf2c25333" providerId="LiveId" clId="{CEC091DF-2F55-496A-BC20-BFDA95465D8E}" dt="2025-07-24T12:38:03.447" v="66" actId="404"/>
+          <ac:spMkLst>
+            <pc:docMk/>
+            <pc:sldMk cId="209001808" sldId="257"/>
+            <ac:spMk id="25" creationId="{B90F459A-B775-DDB3-F504-1DC529A89578}"/>
+          </ac:spMkLst>
+        </pc:spChg>
+        <pc:spChg chg="mod">
+          <ac:chgData name="Nathan Skidmore" userId="a2f2a0bbf2c25333" providerId="LiveId" clId="{CEC091DF-2F55-496A-BC20-BFDA95465D8E}" dt="2025-07-24T12:55:31.054" v="87" actId="20577"/>
+          <ac:spMkLst>
+            <pc:docMk/>
+            <pc:sldMk cId="209001808" sldId="257"/>
+            <ac:spMk id="26" creationId="{D365CF84-5519-5831-BD1F-692A4F41355D}"/>
+          </ac:spMkLst>
+        </pc:spChg>
+        <pc:spChg chg="mod">
+          <ac:chgData name="Nathan Skidmore" userId="a2f2a0bbf2c25333" providerId="LiveId" clId="{CEC091DF-2F55-496A-BC20-BFDA95465D8E}" dt="2025-07-24T12:52:46.494" v="78" actId="1076"/>
+          <ac:spMkLst>
+            <pc:docMk/>
+            <pc:sldMk cId="209001808" sldId="257"/>
+            <ac:spMk id="27" creationId="{3A587190-84D6-1C37-85FC-4DCFC75D04C8}"/>
+          </ac:spMkLst>
+        </pc:spChg>
+        <pc:spChg chg="mod">
+          <ac:chgData name="Nathan Skidmore" userId="a2f2a0bbf2c25333" providerId="LiveId" clId="{CEC091DF-2F55-496A-BC20-BFDA95465D8E}" dt="2025-07-24T12:52:46.494" v="78" actId="1076"/>
+          <ac:spMkLst>
+            <pc:docMk/>
+            <pc:sldMk cId="209001808" sldId="257"/>
+            <ac:spMk id="28" creationId="{0EB08BDB-3D8E-1AE8-9CDE-C45289649C40}"/>
+          </ac:spMkLst>
+        </pc:spChg>
+        <pc:spChg chg="add mod">
+          <ac:chgData name="Nathan Skidmore" userId="a2f2a0bbf2c25333" providerId="LiveId" clId="{CEC091DF-2F55-496A-BC20-BFDA95465D8E}" dt="2025-07-24T12:57:25.741" v="110" actId="20577"/>
+          <ac:spMkLst>
+            <pc:docMk/>
+            <pc:sldMk cId="209001808" sldId="257"/>
+            <ac:spMk id="29" creationId="{5224A102-52CD-7396-100F-2B0F7339822B}"/>
+          </ac:spMkLst>
+        </pc:spChg>
+        <pc:spChg chg="mod">
+          <ac:chgData name="Nathan Skidmore" userId="a2f2a0bbf2c25333" providerId="LiveId" clId="{CEC091DF-2F55-496A-BC20-BFDA95465D8E}" dt="2025-07-24T12:53:00.556" v="81" actId="1076"/>
+          <ac:spMkLst>
+            <pc:docMk/>
+            <pc:sldMk cId="209001808" sldId="257"/>
+            <ac:spMk id="30" creationId="{4D9316FF-E1EA-FB25-CFD7-7C5BA973D438}"/>
+          </ac:spMkLst>
+        </pc:spChg>
+        <pc:spChg chg="add mod">
+          <ac:chgData name="Nathan Skidmore" userId="a2f2a0bbf2c25333" providerId="LiveId" clId="{CEC091DF-2F55-496A-BC20-BFDA95465D8E}" dt="2025-07-24T12:53:00.556" v="81" actId="1076"/>
+          <ac:spMkLst>
+            <pc:docMk/>
+            <pc:sldMk cId="209001808" sldId="257"/>
+            <ac:spMk id="31" creationId="{D27F46B5-127A-64AC-FF88-530DD8835BB3}"/>
+          </ac:spMkLst>
+        </pc:spChg>
+        <pc:spChg chg="mod">
+          <ac:chgData name="Nathan Skidmore" userId="a2f2a0bbf2c25333" providerId="LiveId" clId="{CEC091DF-2F55-496A-BC20-BFDA95465D8E}" dt="2025-07-24T12:53:00.556" v="81" actId="1076"/>
+          <ac:spMkLst>
+            <pc:docMk/>
+            <pc:sldMk cId="209001808" sldId="257"/>
+            <ac:spMk id="32" creationId="{A8451D66-BC9B-20F2-F57B-22ED3512147C}"/>
+          </ac:spMkLst>
+        </pc:spChg>
+        <pc:spChg chg="mod">
+          <ac:chgData name="Nathan Skidmore" userId="a2f2a0bbf2c25333" providerId="LiveId" clId="{CEC091DF-2F55-496A-BC20-BFDA95465D8E}" dt="2025-07-24T12:53:00.556" v="81" actId="1076"/>
+          <ac:spMkLst>
+            <pc:docMk/>
+            <pc:sldMk cId="209001808" sldId="257"/>
+            <ac:spMk id="33" creationId="{75B2D97E-BC08-6D9F-5A15-5FE2576DAEFE}"/>
+          </ac:spMkLst>
+        </pc:spChg>
+        <pc:spChg chg="add mod">
+          <ac:chgData name="Nathan Skidmore" userId="a2f2a0bbf2c25333" providerId="LiveId" clId="{CEC091DF-2F55-496A-BC20-BFDA95465D8E}" dt="2025-07-24T12:57:21.170" v="108" actId="1076"/>
+          <ac:spMkLst>
+            <pc:docMk/>
+            <pc:sldMk cId="209001808" sldId="257"/>
+            <ac:spMk id="34" creationId="{1D0C9807-F668-7C00-0D19-0753435BECED}"/>
+          </ac:spMkLst>
+        </pc:spChg>
+        <pc:spChg chg="mod">
+          <ac:chgData name="Nathan Skidmore" userId="a2f2a0bbf2c25333" providerId="LiveId" clId="{CEC091DF-2F55-496A-BC20-BFDA95465D8E}" dt="2025-07-24T12:44:25.924" v="77" actId="403"/>
+          <ac:spMkLst>
+            <pc:docMk/>
+            <pc:sldMk cId="209001808" sldId="257"/>
+            <ac:spMk id="35" creationId="{D9579C4C-F061-2826-4648-0B9A23A9FDFD}"/>
+          </ac:spMkLst>
+        </pc:spChg>
+        <pc:spChg chg="mod">
+          <ac:chgData name="Nathan Skidmore" userId="a2f2a0bbf2c25333" providerId="LiveId" clId="{CEC091DF-2F55-496A-BC20-BFDA95465D8E}" dt="2025-07-24T12:56:20.662" v="95"/>
+          <ac:spMkLst>
+            <pc:docMk/>
+            <pc:sldMk cId="209001808" sldId="257"/>
+            <ac:spMk id="36" creationId="{CD53A651-404A-FC28-F7D1-4E177A47916B}"/>
+          </ac:spMkLst>
+        </pc:spChg>
+        <pc:spChg chg="mod">
+          <ac:chgData name="Nathan Skidmore" userId="a2f2a0bbf2c25333" providerId="LiveId" clId="{CEC091DF-2F55-496A-BC20-BFDA95465D8E}" dt="2025-07-24T12:56:31.200" v="98"/>
+          <ac:spMkLst>
+            <pc:docMk/>
+            <pc:sldMk cId="209001808" sldId="257"/>
+            <ac:spMk id="38" creationId="{32C216E0-E4CB-773D-E2AB-9DBA283C7F34}"/>
+          </ac:spMkLst>
+        </pc:spChg>
+        <pc:spChg chg="mod">
+          <ac:chgData name="Nathan Skidmore" userId="a2f2a0bbf2c25333" providerId="LiveId" clId="{CEC091DF-2F55-496A-BC20-BFDA95465D8E}" dt="2025-07-24T12:56:31.200" v="98"/>
+          <ac:spMkLst>
+            <pc:docMk/>
+            <pc:sldMk cId="209001808" sldId="257"/>
+            <ac:spMk id="39" creationId="{0A791A2C-E73A-F9A1-955B-74CFAC026AFA}"/>
+          </ac:spMkLst>
+        </pc:spChg>
+        <pc:spChg chg="add mod">
+          <ac:chgData name="Nathan Skidmore" userId="a2f2a0bbf2c25333" providerId="LiveId" clId="{CEC091DF-2F55-496A-BC20-BFDA95465D8E}" dt="2025-07-24T12:58:14.644" v="123" actId="962"/>
+          <ac:spMkLst>
+            <pc:docMk/>
+            <pc:sldMk cId="209001808" sldId="257"/>
+            <ac:spMk id="40" creationId="{F773F1C0-14CC-7DC4-B8AF-8640E65044E8}"/>
+          </ac:spMkLst>
+        </pc:spChg>
+        <pc:spChg chg="add mod">
+          <ac:chgData name="Nathan Skidmore" userId="a2f2a0bbf2c25333" providerId="LiveId" clId="{CEC091DF-2F55-496A-BC20-BFDA95465D8E}" dt="2025-07-24T12:58:17.859" v="124" actId="962"/>
+          <ac:spMkLst>
+            <pc:docMk/>
+            <pc:sldMk cId="209001808" sldId="257"/>
+            <ac:spMk id="41" creationId="{AFB34D1B-189D-C36A-FC74-FFAD181B3378}"/>
+          </ac:spMkLst>
+        </pc:spChg>
+        <pc:grpChg chg="add mod">
+          <ac:chgData name="Nathan Skidmore" userId="a2f2a0bbf2c25333" providerId="LiveId" clId="{CEC091DF-2F55-496A-BC20-BFDA95465D8E}" dt="2025-07-24T12:57:44" v="119" actId="1076"/>
+          <ac:grpSpMkLst>
+            <pc:docMk/>
+            <pc:sldMk cId="209001808" sldId="257"/>
+            <ac:grpSpMk id="2" creationId="{7D6175CD-AFF2-43E7-3609-1452C96D76B1}"/>
+          </ac:grpSpMkLst>
+        </pc:grpChg>
+        <pc:grpChg chg="mod">
+          <ac:chgData name="Nathan Skidmore" userId="a2f2a0bbf2c25333" providerId="LiveId" clId="{CEC091DF-2F55-496A-BC20-BFDA95465D8E}" dt="2025-07-24T12:54:32.151" v="84" actId="14100"/>
+          <ac:grpSpMkLst>
+            <pc:docMk/>
+            <pc:sldMk cId="209001808" sldId="257"/>
+            <ac:grpSpMk id="5" creationId="{87A75CCC-AF47-7E96-A3E2-53744857FC4E}"/>
+          </ac:grpSpMkLst>
+        </pc:grpChg>
+        <pc:grpChg chg="mod">
+          <ac:chgData name="Nathan Skidmore" userId="a2f2a0bbf2c25333" providerId="LiveId" clId="{CEC091DF-2F55-496A-BC20-BFDA95465D8E}" dt="2025-07-24T12:57:32.232" v="113" actId="1076"/>
+          <ac:grpSpMkLst>
+            <pc:docMk/>
+            <pc:sldMk cId="209001808" sldId="257"/>
+            <ac:grpSpMk id="9" creationId="{40C3E37B-B253-61E3-9CD5-4AEF240AF78A}"/>
+          </ac:grpSpMkLst>
+        </pc:grpChg>
+        <pc:grpChg chg="add mod">
+          <ac:chgData name="Nathan Skidmore" userId="a2f2a0bbf2c25333" providerId="LiveId" clId="{CEC091DF-2F55-496A-BC20-BFDA95465D8E}" dt="2025-07-24T12:57:14.472" v="107" actId="14100"/>
+          <ac:grpSpMkLst>
+            <pc:docMk/>
+            <pc:sldMk cId="209001808" sldId="257"/>
+            <ac:grpSpMk id="37" creationId="{966EC2C8-80E7-4CFF-120E-3E3DCB267BFE}"/>
+          </ac:grpSpMkLst>
+        </pc:grpChg>
+      </pc:sldChg>
+      <pc:sldChg chg="addSp modSp new mod">
+        <pc:chgData name="Nathan Skidmore" userId="a2f2a0bbf2c25333" providerId="LiveId" clId="{CEC091DF-2F55-496A-BC20-BFDA95465D8E}" dt="2025-07-24T13:26:45.647" v="159" actId="14100"/>
+        <pc:sldMkLst>
+          <pc:docMk/>
+          <pc:sldMk cId="1179720046" sldId="258"/>
+        </pc:sldMkLst>
+        <pc:spChg chg="mod ord">
+          <ac:chgData name="Nathan Skidmore" userId="a2f2a0bbf2c25333" providerId="LiveId" clId="{CEC091DF-2F55-496A-BC20-BFDA95465D8E}" dt="2025-07-24T13:00:40.264" v="148" actId="962"/>
+          <ac:spMkLst>
+            <pc:docMk/>
+            <pc:sldMk cId="1179720046" sldId="258"/>
+            <ac:spMk id="2" creationId="{3F3DE413-E45C-8B53-E3A4-23B0372051CF}"/>
+          </ac:spMkLst>
+        </pc:spChg>
+        <pc:spChg chg="mod ord">
+          <ac:chgData name="Nathan Skidmore" userId="a2f2a0bbf2c25333" providerId="LiveId" clId="{CEC091DF-2F55-496A-BC20-BFDA95465D8E}" dt="2025-07-24T13:00:38.431" v="147" actId="962"/>
+          <ac:spMkLst>
+            <pc:docMk/>
+            <pc:sldMk cId="1179720046" sldId="258"/>
+            <ac:spMk id="3" creationId="{03297ABF-617D-3140-8E42-431A3816DF14}"/>
+          </ac:spMkLst>
+        </pc:spChg>
+        <pc:spChg chg="mod ord">
+          <ac:chgData name="Nathan Skidmore" userId="a2f2a0bbf2c25333" providerId="LiveId" clId="{CEC091DF-2F55-496A-BC20-BFDA95465D8E}" dt="2025-07-24T13:00:36.585" v="146" actId="962"/>
+          <ac:spMkLst>
+            <pc:docMk/>
+            <pc:sldMk cId="1179720046" sldId="258"/>
+            <ac:spMk id="4" creationId="{C9E777CD-9360-806E-A4AC-EE0E47DA766F}"/>
+          </ac:spMkLst>
+        </pc:spChg>
+        <pc:spChg chg="mod">
+          <ac:chgData name="Nathan Skidmore" userId="a2f2a0bbf2c25333" providerId="LiveId" clId="{CEC091DF-2F55-496A-BC20-BFDA95465D8E}" dt="2025-07-24T12:58:42.584" v="129"/>
+          <ac:spMkLst>
+            <pc:docMk/>
+            <pc:sldMk cId="1179720046" sldId="258"/>
+            <ac:spMk id="11" creationId="{79DA4A9E-5CDA-ECFA-1FB2-291595C06387}"/>
+          </ac:spMkLst>
+        </pc:spChg>
+        <pc:spChg chg="add mod">
+          <ac:chgData name="Nathan Skidmore" userId="a2f2a0bbf2c25333" providerId="LiveId" clId="{CEC091DF-2F55-496A-BC20-BFDA95465D8E}" dt="2025-07-24T12:58:42.584" v="129"/>
+          <ac:spMkLst>
+            <pc:docMk/>
+            <pc:sldMk cId="1179720046" sldId="258"/>
+            <ac:spMk id="18" creationId="{6C3E04C9-BE10-AAEE-19AA-2DACDC389561}"/>
+          </ac:spMkLst>
+        </pc:spChg>
+        <pc:spChg chg="add mod">
+          <ac:chgData name="Nathan Skidmore" userId="a2f2a0bbf2c25333" providerId="LiveId" clId="{CEC091DF-2F55-496A-BC20-BFDA95465D8E}" dt="2025-07-24T12:58:42.584" v="129"/>
+          <ac:spMkLst>
+            <pc:docMk/>
+            <pc:sldMk cId="1179720046" sldId="258"/>
+            <ac:spMk id="20" creationId="{CBD6C082-E7D0-DA4A-407D-2C97B82CAA8A}"/>
+          </ac:spMkLst>
+        </pc:spChg>
+        <pc:spChg chg="add mod">
+          <ac:chgData name="Nathan Skidmore" userId="a2f2a0bbf2c25333" providerId="LiveId" clId="{CEC091DF-2F55-496A-BC20-BFDA95465D8E}" dt="2025-07-24T12:58:42.584" v="129"/>
+          <ac:spMkLst>
+            <pc:docMk/>
+            <pc:sldMk cId="1179720046" sldId="258"/>
+            <ac:spMk id="22" creationId="{ABBD0847-10C3-EF3E-2C39-122891CFACB4}"/>
+          </ac:spMkLst>
+        </pc:spChg>
+        <pc:spChg chg="add mod">
+          <ac:chgData name="Nathan Skidmore" userId="a2f2a0bbf2c25333" providerId="LiveId" clId="{CEC091DF-2F55-496A-BC20-BFDA95465D8E}" dt="2025-07-24T12:58:42.584" v="129"/>
+          <ac:spMkLst>
+            <pc:docMk/>
+            <pc:sldMk cId="1179720046" sldId="258"/>
+            <ac:spMk id="25" creationId="{21F45556-9CE7-BFEE-227B-3211D2F97CF3}"/>
+          </ac:spMkLst>
+        </pc:spChg>
+        <pc:spChg chg="add mod">
+          <ac:chgData name="Nathan Skidmore" userId="a2f2a0bbf2c25333" providerId="LiveId" clId="{CEC091DF-2F55-496A-BC20-BFDA95465D8E}" dt="2025-07-24T12:58:42.584" v="129"/>
+          <ac:spMkLst>
+            <pc:docMk/>
+            <pc:sldMk cId="1179720046" sldId="258"/>
+            <ac:spMk id="28" creationId="{420CDE4F-FFA0-9065-F103-2F0EFE80E5CE}"/>
+          </ac:spMkLst>
+        </pc:spChg>
+        <pc:spChg chg="add mod">
+          <ac:chgData name="Nathan Skidmore" userId="a2f2a0bbf2c25333" providerId="LiveId" clId="{CEC091DF-2F55-496A-BC20-BFDA95465D8E}" dt="2025-07-24T13:26:40.446" v="157" actId="14100"/>
+          <ac:spMkLst>
+            <pc:docMk/>
+            <pc:sldMk cId="1179720046" sldId="258"/>
+            <ac:spMk id="29" creationId="{F1DFCC17-6102-BF02-9092-D84ECCADAF11}"/>
+          </ac:spMkLst>
+        </pc:spChg>
+        <pc:spChg chg="add mod">
+          <ac:chgData name="Nathan Skidmore" userId="a2f2a0bbf2c25333" providerId="LiveId" clId="{CEC091DF-2F55-496A-BC20-BFDA95465D8E}" dt="2025-07-24T12:58:42.584" v="129"/>
+          <ac:spMkLst>
+            <pc:docMk/>
+            <pc:sldMk cId="1179720046" sldId="258"/>
+            <ac:spMk id="31" creationId="{01DD30E7-587C-AA16-A334-802C3CA7E1DB}"/>
+          </ac:spMkLst>
+        </pc:spChg>
+        <pc:spChg chg="add mod">
+          <ac:chgData name="Nathan Skidmore" userId="a2f2a0bbf2c25333" providerId="LiveId" clId="{CEC091DF-2F55-496A-BC20-BFDA95465D8E}" dt="2025-07-24T12:58:42.584" v="129"/>
+          <ac:spMkLst>
+            <pc:docMk/>
+            <pc:sldMk cId="1179720046" sldId="258"/>
+            <ac:spMk id="33" creationId="{3D3071DB-0ACA-EA8F-4DE2-3D684E6448BB}"/>
+          </ac:spMkLst>
+        </pc:spChg>
+        <pc:spChg chg="add mod">
+          <ac:chgData name="Nathan Skidmore" userId="a2f2a0bbf2c25333" providerId="LiveId" clId="{CEC091DF-2F55-496A-BC20-BFDA95465D8E}" dt="2025-07-24T12:58:42.584" v="129"/>
+          <ac:spMkLst>
+            <pc:docMk/>
+            <pc:sldMk cId="1179720046" sldId="258"/>
+            <ac:spMk id="34" creationId="{30C29C4B-9858-3960-85D8-D6A2A020B75F}"/>
+          </ac:spMkLst>
+        </pc:spChg>
+        <pc:spChg chg="mod">
+          <ac:chgData name="Nathan Skidmore" userId="a2f2a0bbf2c25333" providerId="LiveId" clId="{CEC091DF-2F55-496A-BC20-BFDA95465D8E}" dt="2025-07-24T13:26:31.686" v="155" actId="14100"/>
+          <ac:spMkLst>
+            <pc:docMk/>
+            <pc:sldMk cId="1179720046" sldId="258"/>
+            <ac:spMk id="42" creationId="{29DB027E-82E7-59BB-90EF-0E16A01EBE91}"/>
+          </ac:spMkLst>
+        </pc:spChg>
+        <pc:spChg chg="mod">
+          <ac:chgData name="Nathan Skidmore" userId="a2f2a0bbf2c25333" providerId="LiveId" clId="{CEC091DF-2F55-496A-BC20-BFDA95465D8E}" dt="2025-07-24T13:26:45.647" v="159" actId="14100"/>
+          <ac:spMkLst>
+            <pc:docMk/>
+            <pc:sldMk cId="1179720046" sldId="258"/>
+            <ac:spMk id="43" creationId="{0EE9E92C-9370-C63C-860B-91C66E7C6835}"/>
+          </ac:spMkLst>
+        </pc:spChg>
+        <pc:grpChg chg="mod">
+          <ac:chgData name="Nathan Skidmore" userId="a2f2a0bbf2c25333" providerId="LiveId" clId="{CEC091DF-2F55-496A-BC20-BFDA95465D8E}" dt="2025-07-24T13:26:23.238" v="152" actId="1076"/>
+          <ac:grpSpMkLst>
+            <pc:docMk/>
+            <pc:sldMk cId="1179720046" sldId="258"/>
+            <ac:grpSpMk id="36" creationId="{0757FACC-BCBC-6919-6716-03BB351D01FD}"/>
+          </ac:grpSpMkLst>
+        </pc:grpChg>
+      </pc:sldChg>
+      <pc:sldMasterChg chg="modSldLayout">
+        <pc:chgData name="Nathan Skidmore" userId="a2f2a0bbf2c25333" providerId="LiveId" clId="{CEC091DF-2F55-496A-BC20-BFDA95465D8E}" dt="2025-07-24T12:58:33.160" v="127" actId="478"/>
+        <pc:sldMasterMkLst>
+          <pc:docMk/>
+          <pc:sldMasterMk cId="0" sldId="2147483648"/>
+        </pc:sldMasterMkLst>
+        <pc:sldLayoutChg chg="addSp delSp modSp mod">
+          <pc:chgData name="Nathan Skidmore" userId="a2f2a0bbf2c25333" providerId="LiveId" clId="{CEC091DF-2F55-496A-BC20-BFDA95465D8E}" dt="2025-07-24T12:58:33.160" v="127" actId="478"/>
+          <pc:sldLayoutMkLst>
+            <pc:docMk/>
+            <pc:sldMasterMk cId="0" sldId="2147483648"/>
+            <pc:sldLayoutMk cId="0" sldId="2147483649"/>
+          </pc:sldLayoutMkLst>
+          <pc:spChg chg="del">
+            <ac:chgData name="Nathan Skidmore" userId="a2f2a0bbf2c25333" providerId="LiveId" clId="{CEC091DF-2F55-496A-BC20-BFDA95465D8E}" dt="2025-07-24T12:58:33.160" v="127" actId="478"/>
+            <ac:spMkLst>
+              <pc:docMk/>
+              <pc:sldMasterMk cId="0" sldId="2147483648"/>
+              <pc:sldLayoutMk cId="0" sldId="2147483649"/>
+              <ac:spMk id="2" creationId="{00000000-0000-0000-0000-000000000000}"/>
+            </ac:spMkLst>
+          </pc:spChg>
+          <pc:spChg chg="del">
+            <ac:chgData name="Nathan Skidmore" userId="a2f2a0bbf2c25333" providerId="LiveId" clId="{CEC091DF-2F55-496A-BC20-BFDA95465D8E}" dt="2025-07-24T12:58:33.160" v="127" actId="478"/>
+            <ac:spMkLst>
+              <pc:docMk/>
+              <pc:sldMasterMk cId="0" sldId="2147483648"/>
+              <pc:sldLayoutMk cId="0" sldId="2147483649"/>
+              <ac:spMk id="3" creationId="{00000000-0000-0000-0000-000000000000}"/>
+            </ac:spMkLst>
+          </pc:spChg>
+          <pc:spChg chg="del">
+            <ac:chgData name="Nathan Skidmore" userId="a2f2a0bbf2c25333" providerId="LiveId" clId="{CEC091DF-2F55-496A-BC20-BFDA95465D8E}" dt="2025-07-24T12:58:33.160" v="127" actId="478"/>
+            <ac:spMkLst>
+              <pc:docMk/>
+              <pc:sldMasterMk cId="0" sldId="2147483648"/>
+              <pc:sldLayoutMk cId="0" sldId="2147483649"/>
+              <ac:spMk id="4" creationId="{00000000-0000-0000-0000-000000000000}"/>
+            </ac:spMkLst>
+          </pc:spChg>
+          <pc:spChg chg="del">
+            <ac:chgData name="Nathan Skidmore" userId="a2f2a0bbf2c25333" providerId="LiveId" clId="{CEC091DF-2F55-496A-BC20-BFDA95465D8E}" dt="2025-07-24T12:58:33.160" v="127" actId="478"/>
+            <ac:spMkLst>
+              <pc:docMk/>
+              <pc:sldMasterMk cId="0" sldId="2147483648"/>
+              <pc:sldLayoutMk cId="0" sldId="2147483649"/>
+              <ac:spMk id="5" creationId="{00000000-0000-0000-0000-000000000000}"/>
+            </ac:spMkLst>
+          </pc:spChg>
+          <pc:spChg chg="del">
+            <ac:chgData name="Nathan Skidmore" userId="a2f2a0bbf2c25333" providerId="LiveId" clId="{CEC091DF-2F55-496A-BC20-BFDA95465D8E}" dt="2025-07-24T12:58:33.160" v="127" actId="478"/>
+            <ac:spMkLst>
+              <pc:docMk/>
+              <pc:sldMasterMk cId="0" sldId="2147483648"/>
+              <pc:sldLayoutMk cId="0" sldId="2147483649"/>
+              <ac:spMk id="6" creationId="{00000000-0000-0000-0000-000000000000}"/>
+            </ac:spMkLst>
+          </pc:spChg>
+          <pc:spChg chg="add del">
+            <ac:chgData name="Nathan Skidmore" userId="a2f2a0bbf2c25333" providerId="LiveId" clId="{CEC091DF-2F55-496A-BC20-BFDA95465D8E}" dt="2025-07-24T12:36:28.684" v="46" actId="11529"/>
+            <ac:spMkLst>
+              <pc:docMk/>
+              <pc:sldMasterMk cId="0" sldId="2147483648"/>
+              <pc:sldLayoutMk cId="0" sldId="2147483649"/>
+              <ac:spMk id="7" creationId="{2895EE34-D20E-82DB-7B35-83C20114584B}"/>
+            </ac:spMkLst>
+          </pc:spChg>
+          <pc:spChg chg="add del">
+            <ac:chgData name="Nathan Skidmore" userId="a2f2a0bbf2c25333" providerId="LiveId" clId="{CEC091DF-2F55-496A-BC20-BFDA95465D8E}" dt="2025-07-24T12:58:26.890" v="125" actId="11529"/>
+            <ac:spMkLst>
+              <pc:docMk/>
+              <pc:sldMasterMk cId="0" sldId="2147483648"/>
+              <pc:sldLayoutMk cId="0" sldId="2147483649"/>
+              <ac:spMk id="7" creationId="{5671E0BA-5EB5-90EC-4245-F6E774073F69}"/>
+            </ac:spMkLst>
+          </pc:spChg>
+          <pc:spChg chg="add mod">
+            <ac:chgData name="Nathan Skidmore" userId="a2f2a0bbf2c25333" providerId="LiveId" clId="{CEC091DF-2F55-496A-BC20-BFDA95465D8E}" dt="2025-07-24T12:36:31.603" v="48" actId="14100"/>
+            <ac:spMkLst>
+              <pc:docMk/>
+              <pc:sldMasterMk cId="0" sldId="2147483648"/>
+              <pc:sldLayoutMk cId="0" sldId="2147483649"/>
+              <ac:spMk id="8" creationId="{697434E3-4FD9-66A7-15FF-63A7D1DAFFC0}"/>
+            </ac:spMkLst>
+          </pc:spChg>
+          <pc:spChg chg="add mod">
+            <ac:chgData name="Nathan Skidmore" userId="a2f2a0bbf2c25333" providerId="LiveId" clId="{CEC091DF-2F55-496A-BC20-BFDA95465D8E}" dt="2025-07-24T12:58:26.890" v="125" actId="11529"/>
+            <ac:spMkLst>
+              <pc:docMk/>
+              <pc:sldMasterMk cId="0" sldId="2147483648"/>
+              <pc:sldLayoutMk cId="0" sldId="2147483649"/>
+              <ac:spMk id="9" creationId="{274C8DD3-D681-A812-17F5-4B83686E13BC}"/>
+            </ac:spMkLst>
+          </pc:spChg>
+          <pc:spChg chg="add del">
+            <ac:chgData name="Nathan Skidmore" userId="a2f2a0bbf2c25333" providerId="LiveId" clId="{CEC091DF-2F55-496A-BC20-BFDA95465D8E}" dt="2025-07-24T12:58:31.116" v="126" actId="11529"/>
+            <ac:spMkLst>
+              <pc:docMk/>
+              <pc:sldMasterMk cId="0" sldId="2147483648"/>
+              <pc:sldLayoutMk cId="0" sldId="2147483649"/>
+              <ac:spMk id="10" creationId="{B3AF41C3-2782-9E1E-6A82-1BBDCCA9F808}"/>
+            </ac:spMkLst>
+          </pc:spChg>
+          <pc:spChg chg="add mod">
+            <ac:chgData name="Nathan Skidmore" userId="a2f2a0bbf2c25333" providerId="LiveId" clId="{CEC091DF-2F55-496A-BC20-BFDA95465D8E}" dt="2025-07-24T12:58:31.116" v="126" actId="11529"/>
+            <ac:spMkLst>
+              <pc:docMk/>
+              <pc:sldMasterMk cId="0" sldId="2147483648"/>
+              <pc:sldLayoutMk cId="0" sldId="2147483649"/>
+              <ac:spMk id="11" creationId="{A3FFDBE3-A01B-4E12-E379-D28D661C99EE}"/>
+            </ac:spMkLst>
+          </pc:spChg>
+        </pc:sldLayoutChg>
+      </pc:sldMasterChg>
     </pc:docChg>
   </pc:docChgLst>
 </pc:chgInfo>
 </file>
 
 <file path=ppt/slideLayouts/slideLayout1.xml><?xml version="1.0" encoding="utf-8"?>
-<p:sldLayout xmlns:a="http://schemas.openxmlformats.org/drawingml/2006/main" xmlns:r="http://schemas.openxmlformats.org/officeDocument/2006/relationships" xmlns:p="http://schemas.openxmlformats.org/presentationml/2006/main" type="title" preserve="1">
+<p:sldLayout xmlns:a="http://schemas.openxmlformats.org/drawingml/2006/main" xmlns:r="http://schemas.openxmlformats.org/officeDocument/2006/relationships" xmlns:p="http://schemas.openxmlformats.org/presentationml/2006/main" preserve="1" userDrawn="1">
   <p:cSld name="Title Slide">
     <p:spTree>
       <p:nvGrpSpPr>
@@ -241,213 +841,91 @@
       </p:grpSpPr>
       <p:sp>
         <p:nvSpPr>
-          <p:cNvPr id="2" name="Title 1"/>
-          <p:cNvSpPr>
-            <a:spLocks noGrp="1"/>
-          </p:cNvSpPr>
-          <p:nvPr>
-            <p:ph type="ctrTitle"/>
+          <p:cNvPr id="8" name="Picture Placeholder 7">
+            <a:extLst>
+              <a:ext uri="{FF2B5EF4-FFF2-40B4-BE49-F238E27FC236}">
+                <a16:creationId xmlns:a16="http://schemas.microsoft.com/office/drawing/2014/main" id="{697434E3-4FD9-66A7-15FF-63A7D1DAFFC0}"/>
+              </a:ext>
+            </a:extLst>
+          </p:cNvPr>
+          <p:cNvSpPr>
+            <a:spLocks noGrp="1"/>
+          </p:cNvSpPr>
+          <p:nvPr>
+            <p:ph type="pic" sz="quarter" idx="13"/>
           </p:nvPr>
         </p:nvSpPr>
         <p:spPr>
           <a:xfrm>
-            <a:off x="685800" y="2130425"/>
-            <a:ext cx="7772400" cy="1470025"/>
+            <a:off x="13462000" y="19189700"/>
+            <a:ext cx="12801600" cy="12649200"/>
           </a:xfrm>
         </p:spPr>
         <p:txBody>
           <a:bodyPr/>
           <a:lstStyle/>
           <a:p>
-            <a:r>
-              <a:rPr lang="en-US"/>
-              <a:t>Click to edit Master title style</a:t>
-            </a:r>
-          </a:p>
-        </p:txBody>
-      </p:sp>
-      <p:sp>
-        <p:nvSpPr>
-          <p:cNvPr id="3" name="Subtitle 2"/>
-          <p:cNvSpPr>
-            <a:spLocks noGrp="1"/>
-          </p:cNvSpPr>
-          <p:nvPr>
-            <p:ph type="subTitle" idx="1"/>
+            <a:endParaRPr lang="en-GB"/>
+          </a:p>
+        </p:txBody>
+      </p:sp>
+      <p:sp>
+        <p:nvSpPr>
+          <p:cNvPr id="9" name="Picture Placeholder 8">
+            <a:extLst>
+              <a:ext uri="{FF2B5EF4-FFF2-40B4-BE49-F238E27FC236}">
+                <a16:creationId xmlns:a16="http://schemas.microsoft.com/office/drawing/2014/main" id="{274C8DD3-D681-A812-17F5-4B83686E13BC}"/>
+              </a:ext>
+            </a:extLst>
+          </p:cNvPr>
+          <p:cNvSpPr>
+            <a:spLocks noGrp="1"/>
+          </p:cNvSpPr>
+          <p:nvPr>
+            <p:ph type="pic" sz="quarter" idx="14"/>
           </p:nvPr>
         </p:nvSpPr>
         <p:spPr>
           <a:xfrm>
-            <a:off x="1371600" y="3886200"/>
-            <a:ext cx="6400800" cy="1752600"/>
+            <a:off x="3708400" y="12103100"/>
+            <a:ext cx="8077200" cy="12344400"/>
           </a:xfrm>
         </p:spPr>
         <p:txBody>
           <a:bodyPr/>
-          <a:lstStyle>
-            <a:lvl1pPr marL="0" indent="0" algn="ctr">
-              <a:buNone/>
-              <a:defRPr>
-                <a:solidFill>
-                  <a:schemeClr val="tx1">
-                    <a:tint val="75000"/>
-                  </a:schemeClr>
-                </a:solidFill>
-              </a:defRPr>
-            </a:lvl1pPr>
-            <a:lvl2pPr marL="457200" indent="0" algn="ctr">
-              <a:buNone/>
-              <a:defRPr>
-                <a:solidFill>
-                  <a:schemeClr val="tx1">
-                    <a:tint val="75000"/>
-                  </a:schemeClr>
-                </a:solidFill>
-              </a:defRPr>
-            </a:lvl2pPr>
-            <a:lvl3pPr marL="914400" indent="0" algn="ctr">
-              <a:buNone/>
-              <a:defRPr>
-                <a:solidFill>
-                  <a:schemeClr val="tx1">
-                    <a:tint val="75000"/>
-                  </a:schemeClr>
-                </a:solidFill>
-              </a:defRPr>
-            </a:lvl3pPr>
-            <a:lvl4pPr marL="1371600" indent="0" algn="ctr">
-              <a:buNone/>
-              <a:defRPr>
-                <a:solidFill>
-                  <a:schemeClr val="tx1">
-                    <a:tint val="75000"/>
-                  </a:schemeClr>
-                </a:solidFill>
-              </a:defRPr>
-            </a:lvl4pPr>
-            <a:lvl5pPr marL="1828800" indent="0" algn="ctr">
-              <a:buNone/>
-              <a:defRPr>
-                <a:solidFill>
-                  <a:schemeClr val="tx1">
-                    <a:tint val="75000"/>
-                  </a:schemeClr>
-                </a:solidFill>
-              </a:defRPr>
-            </a:lvl5pPr>
-            <a:lvl6pPr marL="2286000" indent="0" algn="ctr">
-              <a:buNone/>
-              <a:defRPr>
-                <a:solidFill>
-                  <a:schemeClr val="tx1">
-                    <a:tint val="75000"/>
-                  </a:schemeClr>
-                </a:solidFill>
-              </a:defRPr>
-            </a:lvl6pPr>
-            <a:lvl7pPr marL="2743200" indent="0" algn="ctr">
-              <a:buNone/>
-              <a:defRPr>
-                <a:solidFill>
-                  <a:schemeClr val="tx1">
-                    <a:tint val="75000"/>
-                  </a:schemeClr>
-                </a:solidFill>
-              </a:defRPr>
-            </a:lvl7pPr>
-            <a:lvl8pPr marL="3200400" indent="0" algn="ctr">
-              <a:buNone/>
-              <a:defRPr>
-                <a:solidFill>
-                  <a:schemeClr val="tx1">
-                    <a:tint val="75000"/>
-                  </a:schemeClr>
-                </a:solidFill>
-              </a:defRPr>
-            </a:lvl8pPr>
-            <a:lvl9pPr marL="3657600" indent="0" algn="ctr">
-              <a:buNone/>
-              <a:defRPr>
-                <a:solidFill>
-                  <a:schemeClr val="tx1">
-                    <a:tint val="75000"/>
-                  </a:schemeClr>
-                </a:solidFill>
-              </a:defRPr>
-            </a:lvl9pPr>
-          </a:lstStyle>
-          <a:p>
-            <a:r>
-              <a:rPr lang="en-US"/>
-              <a:t>Click to edit Master subtitle style</a:t>
-            </a:r>
-          </a:p>
-        </p:txBody>
-      </p:sp>
-      <p:sp>
-        <p:nvSpPr>
-          <p:cNvPr id="4" name="Date Placeholder 3"/>
-          <p:cNvSpPr>
-            <a:spLocks noGrp="1"/>
-          </p:cNvSpPr>
-          <p:nvPr>
-            <p:ph type="dt" sz="half" idx="10"/>
-          </p:nvPr>
-        </p:nvSpPr>
-        <p:spPr/>
+          <a:lstStyle/>
+          <a:p>
+            <a:endParaRPr lang="en-GB"/>
+          </a:p>
+        </p:txBody>
+      </p:sp>
+      <p:sp>
+        <p:nvSpPr>
+          <p:cNvPr id="11" name="Picture Placeholder 10">
+            <a:extLst>
+              <a:ext uri="{FF2B5EF4-FFF2-40B4-BE49-F238E27FC236}">
+                <a16:creationId xmlns:a16="http://schemas.microsoft.com/office/drawing/2014/main" id="{A3FFDBE3-A01B-4E12-E379-D28D661C99EE}"/>
+              </a:ext>
+            </a:extLst>
+          </p:cNvPr>
+          <p:cNvSpPr>
+            <a:spLocks noGrp="1"/>
+          </p:cNvSpPr>
+          <p:nvPr>
+            <p:ph type="pic" sz="quarter" idx="15"/>
+          </p:nvPr>
+        </p:nvSpPr>
+        <p:spPr>
+          <a:xfrm>
+            <a:off x="16586200" y="4254500"/>
+            <a:ext cx="8077200" cy="9220200"/>
+          </a:xfrm>
+        </p:spPr>
         <p:txBody>
           <a:bodyPr/>
           <a:lstStyle/>
           <a:p>
-            <a:fld id="{1D8BD707-D9CF-40AE-B4C6-C98DA3205C09}" type="datetimeFigureOut">
-              <a:rPr lang="en-US" smtClean="0"/>
-              <a:pPr/>
-              <a:t>7/23/2025</a:t>
-            </a:fld>
-            <a:endParaRPr lang="en-US"/>
-          </a:p>
-        </p:txBody>
-      </p:sp>
-      <p:sp>
-        <p:nvSpPr>
-          <p:cNvPr id="5" name="Footer Placeholder 4"/>
-          <p:cNvSpPr>
-            <a:spLocks noGrp="1"/>
-          </p:cNvSpPr>
-          <p:nvPr>
-            <p:ph type="ftr" sz="quarter" idx="11"/>
-          </p:nvPr>
-        </p:nvSpPr>
-        <p:spPr/>
-        <p:txBody>
-          <a:bodyPr/>
-          <a:lstStyle/>
-          <a:p>
-            <a:endParaRPr lang="en-US"/>
-          </a:p>
-        </p:txBody>
-      </p:sp>
-      <p:sp>
-        <p:nvSpPr>
-          <p:cNvPr id="6" name="Slide Number Placeholder 5"/>
-          <p:cNvSpPr>
-            <a:spLocks noGrp="1"/>
-          </p:cNvSpPr>
-          <p:nvPr>
-            <p:ph type="sldNum" sz="quarter" idx="12"/>
-          </p:nvPr>
-        </p:nvSpPr>
-        <p:spPr/>
-        <p:txBody>
-          <a:bodyPr/>
-          <a:lstStyle/>
-          <a:p>
-            <a:fld id="{B6F15528-21DE-4FAA-801E-634DDDAF4B2B}" type="slidenum">
-              <a:rPr lang="en-US" smtClean="0"/>
-              <a:pPr/>
-              <a:t>‹#›</a:t>
-            </a:fld>
-            <a:endParaRPr lang="en-US"/>
+            <a:endParaRPr lang="en-GB"/>
           </a:p>
         </p:txBody>
       </p:sp>
@@ -567,7 +1045,7 @@
             <a:fld id="{1D8BD707-D9CF-40AE-B4C6-C98DA3205C09}" type="datetimeFigureOut">
               <a:rPr lang="en-US" smtClean="0"/>
               <a:pPr/>
-              <a:t>7/23/2025</a:t>
+              <a:t>7/24/2025</a:t>
             </a:fld>
             <a:endParaRPr lang="en-US"/>
           </a:p>
@@ -742,7 +1220,7 @@
             <a:fld id="{1D8BD707-D9CF-40AE-B4C6-C98DA3205C09}" type="datetimeFigureOut">
               <a:rPr lang="en-US" smtClean="0"/>
               <a:pPr/>
-              <a:t>7/23/2025</a:t>
+              <a:t>7/24/2025</a:t>
             </a:fld>
             <a:endParaRPr lang="en-US"/>
           </a:p>
@@ -907,7 +1385,7 @@
             <a:fld id="{1D8BD707-D9CF-40AE-B4C6-C98DA3205C09}" type="datetimeFigureOut">
               <a:rPr lang="en-US" smtClean="0"/>
               <a:pPr/>
-              <a:t>7/23/2025</a:t>
+              <a:t>7/24/2025</a:t>
             </a:fld>
             <a:endParaRPr lang="en-US"/>
           </a:p>
@@ -1149,7 +1627,7 @@
             <a:fld id="{1D8BD707-D9CF-40AE-B4C6-C98DA3205C09}" type="datetimeFigureOut">
               <a:rPr lang="en-US" smtClean="0"/>
               <a:pPr/>
-              <a:t>7/23/2025</a:t>
+              <a:t>7/24/2025</a:t>
             </a:fld>
             <a:endParaRPr lang="en-US"/>
           </a:p>
@@ -1431,7 +1909,7 @@
             <a:fld id="{1D8BD707-D9CF-40AE-B4C6-C98DA3205C09}" type="datetimeFigureOut">
               <a:rPr lang="en-US" smtClean="0"/>
               <a:pPr/>
-              <a:t>7/23/2025</a:t>
+              <a:t>7/24/2025</a:t>
             </a:fld>
             <a:endParaRPr lang="en-US"/>
           </a:p>
@@ -1847,7 +2325,7 @@
             <a:fld id="{1D8BD707-D9CF-40AE-B4C6-C98DA3205C09}" type="datetimeFigureOut">
               <a:rPr lang="en-US" smtClean="0"/>
               <a:pPr/>
-              <a:t>7/23/2025</a:t>
+              <a:t>7/24/2025</a:t>
             </a:fld>
             <a:endParaRPr lang="en-US"/>
           </a:p>
@@ -1961,7 +2439,7 @@
             <a:fld id="{1D8BD707-D9CF-40AE-B4C6-C98DA3205C09}" type="datetimeFigureOut">
               <a:rPr lang="en-US" smtClean="0"/>
               <a:pPr/>
-              <a:t>7/23/2025</a:t>
+              <a:t>7/24/2025</a:t>
             </a:fld>
             <a:endParaRPr lang="en-US"/>
           </a:p>
@@ -2053,7 +2531,7 @@
             <a:fld id="{1D8BD707-D9CF-40AE-B4C6-C98DA3205C09}" type="datetimeFigureOut">
               <a:rPr lang="en-US" smtClean="0"/>
               <a:pPr/>
-              <a:t>7/23/2025</a:t>
+              <a:t>7/24/2025</a:t>
             </a:fld>
             <a:endParaRPr lang="en-US"/>
           </a:p>
@@ -2325,7 +2803,7 @@
             <a:fld id="{1D8BD707-D9CF-40AE-B4C6-C98DA3205C09}" type="datetimeFigureOut">
               <a:rPr lang="en-US" smtClean="0"/>
               <a:pPr/>
-              <a:t>7/23/2025</a:t>
+              <a:t>7/24/2025</a:t>
             </a:fld>
             <a:endParaRPr lang="en-US"/>
           </a:p>
@@ -2574,7 +3052,7 @@
             <a:fld id="{1D8BD707-D9CF-40AE-B4C6-C98DA3205C09}" type="datetimeFigureOut">
               <a:rPr lang="en-US" smtClean="0"/>
               <a:pPr/>
-              <a:t>7/23/2025</a:t>
+              <a:t>7/24/2025</a:t>
             </a:fld>
             <a:endParaRPr lang="en-US"/>
           </a:p>
@@ -2782,7 +3260,7 @@
             <a:fld id="{1D8BD707-D9CF-40AE-B4C6-C98DA3205C09}" type="datetimeFigureOut">
               <a:rPr lang="en-US" smtClean="0"/>
               <a:pPr/>
-              <a:t>7/23/2025</a:t>
+              <a:t>7/24/2025</a:t>
             </a:fld>
             <a:endParaRPr lang="en-US"/>
           </a:p>
@@ -3155,21 +3633,33 @@
       </p:grpSpPr>
       <p:grpSp>
         <p:nvGrpSpPr>
-          <p:cNvPr id="2" name="Group 2"/>
+          <p:cNvPr id="5" name="Group 2">
+            <a:extLst>
+              <a:ext uri="{FF2B5EF4-FFF2-40B4-BE49-F238E27FC236}">
+                <a16:creationId xmlns:a16="http://schemas.microsoft.com/office/drawing/2014/main" id="{8C5D2891-CA90-F810-1074-DA159593136E}"/>
+              </a:ext>
+            </a:extLst>
+          </p:cNvPr>
           <p:cNvGrpSpPr/>
           <p:nvPr/>
         </p:nvGrpSpPr>
         <p:grpSpPr>
           <a:xfrm>
-            <a:off x="0" y="5589359"/>
-            <a:ext cx="30276800" cy="36185403"/>
+            <a:off x="0" y="6083300"/>
+            <a:ext cx="30276800" cy="35691462"/>
             <a:chOff x="0" y="0"/>
             <a:chExt cx="3037965" cy="3238153"/>
           </a:xfrm>
         </p:grpSpPr>
         <p:sp>
           <p:nvSpPr>
-            <p:cNvPr id="3" name="Freeform 3"/>
+            <p:cNvPr id="6" name="Freeform 3">
+              <a:extLst>
+                <a:ext uri="{FF2B5EF4-FFF2-40B4-BE49-F238E27FC236}">
+                  <a16:creationId xmlns:a16="http://schemas.microsoft.com/office/drawing/2014/main" id="{8FBE2118-9061-7C20-5988-73D01798EA15}"/>
+                </a:ext>
+              </a:extLst>
+            </p:cNvPr>
             <p:cNvSpPr/>
             <p:nvPr/>
           </p:nvSpPr>
@@ -3216,7 +3706,13 @@
         </p:sp>
         <p:sp>
           <p:nvSpPr>
-            <p:cNvPr id="4" name="TextBox 4"/>
+            <p:cNvPr id="7" name="TextBox 4">
+              <a:extLst>
+                <a:ext uri="{FF2B5EF4-FFF2-40B4-BE49-F238E27FC236}">
+                  <a16:creationId xmlns:a16="http://schemas.microsoft.com/office/drawing/2014/main" id="{C499EB53-08F4-D2FE-5AE7-6BA6C6708F48}"/>
+                </a:ext>
+              </a:extLst>
+            </p:cNvPr>
             <p:cNvSpPr txBox="1"/>
             <p:nvPr/>
           </p:nvSpPr>
@@ -3245,7 +3741,13 @@
       </p:grpSp>
       <p:sp>
         <p:nvSpPr>
-          <p:cNvPr id="5" name="Freeform 5"/>
+          <p:cNvPr id="8" name="Freeform 5">
+            <a:extLst>
+              <a:ext uri="{FF2B5EF4-FFF2-40B4-BE49-F238E27FC236}">
+                <a16:creationId xmlns:a16="http://schemas.microsoft.com/office/drawing/2014/main" id="{A2C4DEA8-1203-0BEB-9241-703FAD532FA5}"/>
+              </a:ext>
+            </a:extLst>
+          </p:cNvPr>
           <p:cNvSpPr/>
           <p:nvPr/>
         </p:nvSpPr>
@@ -3304,21 +3806,33 @@
       </p:sp>
       <p:grpSp>
         <p:nvGrpSpPr>
-          <p:cNvPr id="6" name="Group 6"/>
+          <p:cNvPr id="9" name="Group 6">
+            <a:extLst>
+              <a:ext uri="{FF2B5EF4-FFF2-40B4-BE49-F238E27FC236}">
+                <a16:creationId xmlns:a16="http://schemas.microsoft.com/office/drawing/2014/main" id="{CA88131D-05F8-CD2D-5609-285E153FE550}"/>
+              </a:ext>
+            </a:extLst>
+          </p:cNvPr>
           <p:cNvGrpSpPr/>
           <p:nvPr/>
         </p:nvGrpSpPr>
         <p:grpSpPr>
           <a:xfrm>
-            <a:off x="13357980" y="11083682"/>
-            <a:ext cx="16138081" cy="16138081"/>
+            <a:off x="13357980" y="13015645"/>
+            <a:ext cx="16138081" cy="13336855"/>
             <a:chOff x="0" y="0"/>
             <a:chExt cx="1444162" cy="1444162"/>
           </a:xfrm>
         </p:grpSpPr>
         <p:sp>
           <p:nvSpPr>
-            <p:cNvPr id="7" name="Freeform 7"/>
+            <p:cNvPr id="10" name="Freeform 7">
+              <a:extLst>
+                <a:ext uri="{FF2B5EF4-FFF2-40B4-BE49-F238E27FC236}">
+                  <a16:creationId xmlns:a16="http://schemas.microsoft.com/office/drawing/2014/main" id="{72429CC5-2F59-44C3-1D0C-E316EBB1EE3F}"/>
+                </a:ext>
+              </a:extLst>
+            </p:cNvPr>
             <p:cNvSpPr/>
             <p:nvPr/>
           </p:nvSpPr>
@@ -3388,7 +3902,13 @@
         </p:sp>
         <p:sp>
           <p:nvSpPr>
-            <p:cNvPr id="8" name="TextBox 8"/>
+            <p:cNvPr id="11" name="TextBox 8">
+              <a:extLst>
+                <a:ext uri="{FF2B5EF4-FFF2-40B4-BE49-F238E27FC236}">
+                  <a16:creationId xmlns:a16="http://schemas.microsoft.com/office/drawing/2014/main" id="{79DA4A9E-5CDA-ECFA-1FB2-291595C06387}"/>
+                </a:ext>
+              </a:extLst>
+            </p:cNvPr>
             <p:cNvSpPr txBox="1"/>
             <p:nvPr/>
           </p:nvSpPr>
@@ -3428,7 +3948,13 @@
       </p:grpSp>
       <p:sp>
         <p:nvSpPr>
-          <p:cNvPr id="9" name="Freeform 9"/>
+          <p:cNvPr id="12" name="Freeform 9">
+            <a:extLst>
+              <a:ext uri="{FF2B5EF4-FFF2-40B4-BE49-F238E27FC236}">
+                <a16:creationId xmlns:a16="http://schemas.microsoft.com/office/drawing/2014/main" id="{D0E835FE-B8D0-D925-1DB1-B328ADC7690A}"/>
+              </a:ext>
+            </a:extLst>
+          </p:cNvPr>
           <p:cNvSpPr/>
           <p:nvPr/>
         </p:nvSpPr>
@@ -3487,7 +4013,13 @@
       </p:sp>
       <p:sp>
         <p:nvSpPr>
-          <p:cNvPr id="10" name="Freeform 10"/>
+          <p:cNvPr id="13" name="Freeform 10">
+            <a:extLst>
+              <a:ext uri="{FF2B5EF4-FFF2-40B4-BE49-F238E27FC236}">
+                <a16:creationId xmlns:a16="http://schemas.microsoft.com/office/drawing/2014/main" id="{D17E1E4A-936A-4D06-2B13-81F15C2CC75F}"/>
+              </a:ext>
+            </a:extLst>
+          </p:cNvPr>
           <p:cNvSpPr/>
           <p:nvPr/>
         </p:nvSpPr>
@@ -3546,7 +4078,13 @@
       </p:sp>
       <p:sp>
         <p:nvSpPr>
-          <p:cNvPr id="11" name="Freeform 11"/>
+          <p:cNvPr id="14" name="Freeform 11">
+            <a:extLst>
+              <a:ext uri="{FF2B5EF4-FFF2-40B4-BE49-F238E27FC236}">
+                <a16:creationId xmlns:a16="http://schemas.microsoft.com/office/drawing/2014/main" id="{27CC4FAE-EB98-DA23-D34C-E7A2549A4518}"/>
+              </a:ext>
+            </a:extLst>
+          </p:cNvPr>
           <p:cNvSpPr/>
           <p:nvPr/>
         </p:nvSpPr>
@@ -3605,13 +4143,19 @@
       </p:sp>
       <p:sp>
         <p:nvSpPr>
-          <p:cNvPr id="12" name="Freeform 12"/>
+          <p:cNvPr id="15" name="Freeform 12">
+            <a:extLst>
+              <a:ext uri="{FF2B5EF4-FFF2-40B4-BE49-F238E27FC236}">
+                <a16:creationId xmlns:a16="http://schemas.microsoft.com/office/drawing/2014/main" id="{751AFD7D-9A1C-2140-C3E9-623B7BC95081}"/>
+              </a:ext>
+            </a:extLst>
+          </p:cNvPr>
           <p:cNvSpPr/>
           <p:nvPr/>
         </p:nvSpPr>
         <p:spPr>
           <a:xfrm>
-            <a:off x="13357980" y="31616336"/>
+            <a:off x="13357980" y="34241806"/>
             <a:ext cx="7585543" cy="1420565"/>
           </a:xfrm>
           <a:custGeom>
@@ -3664,13 +4208,19 @@
       </p:sp>
       <p:sp>
         <p:nvSpPr>
-          <p:cNvPr id="13" name="Freeform 13"/>
+          <p:cNvPr id="16" name="Freeform 13">
+            <a:extLst>
+              <a:ext uri="{FF2B5EF4-FFF2-40B4-BE49-F238E27FC236}">
+                <a16:creationId xmlns:a16="http://schemas.microsoft.com/office/drawing/2014/main" id="{F2F1DD67-E32A-CAA5-F711-F92517E5FEFC}"/>
+              </a:ext>
+            </a:extLst>
+          </p:cNvPr>
           <p:cNvSpPr/>
           <p:nvPr/>
         </p:nvSpPr>
         <p:spPr>
           <a:xfrm>
-            <a:off x="779939" y="17732157"/>
+            <a:off x="779939" y="16495006"/>
             <a:ext cx="7585543" cy="1420565"/>
           </a:xfrm>
           <a:custGeom>
@@ -3723,13 +4273,19 @@
       </p:sp>
       <p:sp>
         <p:nvSpPr>
-          <p:cNvPr id="14" name="Freeform 14"/>
+          <p:cNvPr id="17" name="Freeform 14">
+            <a:extLst>
+              <a:ext uri="{FF2B5EF4-FFF2-40B4-BE49-F238E27FC236}">
+                <a16:creationId xmlns:a16="http://schemas.microsoft.com/office/drawing/2014/main" id="{4150583D-7202-DC13-4E60-F79F1CF5C25D}"/>
+              </a:ext>
+            </a:extLst>
+          </p:cNvPr>
           <p:cNvSpPr/>
           <p:nvPr/>
         </p:nvSpPr>
         <p:spPr>
           <a:xfrm>
-            <a:off x="812149" y="23358963"/>
+            <a:off x="812149" y="23811595"/>
             <a:ext cx="12110400" cy="12496660"/>
           </a:xfrm>
           <a:custGeom>
@@ -3782,7 +4338,13 @@
       </p:sp>
       <p:sp>
         <p:nvSpPr>
-          <p:cNvPr id="15" name="TextBox 15"/>
+          <p:cNvPr id="18" name="TitleBox">
+            <a:extLst>
+              <a:ext uri="{FF2B5EF4-FFF2-40B4-BE49-F238E27FC236}">
+                <a16:creationId xmlns:a16="http://schemas.microsoft.com/office/drawing/2014/main" id="{6C3E04C9-BE10-AAEE-19AA-2DACDC389561}"/>
+              </a:ext>
+            </a:extLst>
+          </p:cNvPr>
           <p:cNvSpPr txBox="1"/>
           <p:nvPr/>
         </p:nvSpPr>
@@ -3823,13 +4385,19 @@
       </p:sp>
       <p:sp>
         <p:nvSpPr>
-          <p:cNvPr id="16" name="TextBox 16"/>
+          <p:cNvPr id="19" name="AuthorBox">
+            <a:extLst>
+              <a:ext uri="{FF2B5EF4-FFF2-40B4-BE49-F238E27FC236}">
+                <a16:creationId xmlns:a16="http://schemas.microsoft.com/office/drawing/2014/main" id="{D3F44D44-999B-4958-E30D-4C6F6FE93983}"/>
+              </a:ext>
+            </a:extLst>
+          </p:cNvPr>
           <p:cNvSpPr txBox="1"/>
           <p:nvPr/>
         </p:nvSpPr>
         <p:spPr>
           <a:xfrm>
-            <a:off x="779939" y="2373550"/>
+            <a:off x="779939" y="2625142"/>
             <a:ext cx="28716122" cy="1184275"/>
           </a:xfrm>
           <a:prstGeom prst="rect">
@@ -3848,7 +4416,7 @@
               </a:lnSpc>
             </a:pPr>
             <a:r>
-              <a:rPr lang="en-US" sz="6999">
+              <a:rPr lang="en-US" sz="6999" dirty="0">
                 <a:solidFill>
                   <a:srgbClr val="05BBD6"/>
                 </a:solidFill>
@@ -3864,13 +4432,19 @@
       </p:sp>
       <p:sp>
         <p:nvSpPr>
-          <p:cNvPr id="17" name="TextBox 17"/>
+          <p:cNvPr id="20" name="AffiliationBox">
+            <a:extLst>
+              <a:ext uri="{FF2B5EF4-FFF2-40B4-BE49-F238E27FC236}">
+                <a16:creationId xmlns:a16="http://schemas.microsoft.com/office/drawing/2014/main" id="{CBD6C082-E7D0-DA4A-407D-2C97B82CAA8A}"/>
+              </a:ext>
+            </a:extLst>
+          </p:cNvPr>
           <p:cNvSpPr txBox="1"/>
           <p:nvPr/>
         </p:nvSpPr>
         <p:spPr>
           <a:xfrm>
-            <a:off x="779939" y="3976692"/>
+            <a:off x="779939" y="3937145"/>
             <a:ext cx="28716122" cy="523875"/>
           </a:xfrm>
           <a:prstGeom prst="rect">
@@ -3889,7 +4463,7 @@
               </a:lnSpc>
             </a:pPr>
             <a:r>
-              <a:rPr lang="en-US" sz="3000" i="1">
+              <a:rPr lang="en-US" sz="3000" i="1" dirty="0">
                 <a:solidFill>
                   <a:srgbClr val="05BBD6"/>
                 </a:solidFill>
@@ -3905,7 +4479,13 @@
       </p:sp>
       <p:sp>
         <p:nvSpPr>
-          <p:cNvPr id="18" name="TextBox 18"/>
+          <p:cNvPr id="21" name="TextBox 18">
+            <a:extLst>
+              <a:ext uri="{FF2B5EF4-FFF2-40B4-BE49-F238E27FC236}">
+                <a16:creationId xmlns:a16="http://schemas.microsoft.com/office/drawing/2014/main" id="{0BF97F2C-4D7F-012E-055C-3C47156A0158}"/>
+              </a:ext>
+            </a:extLst>
+          </p:cNvPr>
           <p:cNvSpPr txBox="1"/>
           <p:nvPr/>
         </p:nvSpPr>
@@ -3946,7 +4526,13 @@
       </p:sp>
       <p:sp>
         <p:nvSpPr>
-          <p:cNvPr id="19" name="TextBox 19"/>
+          <p:cNvPr id="22" name="TextBox 19">
+            <a:extLst>
+              <a:ext uri="{FF2B5EF4-FFF2-40B4-BE49-F238E27FC236}">
+                <a16:creationId xmlns:a16="http://schemas.microsoft.com/office/drawing/2014/main" id="{ABBD0847-10C3-EF3E-2C39-122891CFACB4}"/>
+              </a:ext>
+            </a:extLst>
+          </p:cNvPr>
           <p:cNvSpPr txBox="1"/>
           <p:nvPr/>
         </p:nvSpPr>
@@ -3987,7 +4573,13 @@
       </p:sp>
       <p:sp>
         <p:nvSpPr>
-          <p:cNvPr id="20" name="TextBox 20"/>
+          <p:cNvPr id="23" name="TextBox 20">
+            <a:extLst>
+              <a:ext uri="{FF2B5EF4-FFF2-40B4-BE49-F238E27FC236}">
+                <a16:creationId xmlns:a16="http://schemas.microsoft.com/office/drawing/2014/main" id="{8052B2F3-03AC-C6E2-CD1B-45FF45B20E52}"/>
+              </a:ext>
+            </a:extLst>
+          </p:cNvPr>
           <p:cNvSpPr txBox="1"/>
           <p:nvPr/>
         </p:nvSpPr>
@@ -4028,13 +4620,19 @@
       </p:sp>
       <p:sp>
         <p:nvSpPr>
-          <p:cNvPr id="21" name="TextBox 21"/>
+          <p:cNvPr id="24" name="TextBox 21">
+            <a:extLst>
+              <a:ext uri="{FF2B5EF4-FFF2-40B4-BE49-F238E27FC236}">
+                <a16:creationId xmlns:a16="http://schemas.microsoft.com/office/drawing/2014/main" id="{603128A9-7BB4-2848-594E-5853D81E85A5}"/>
+              </a:ext>
+            </a:extLst>
+          </p:cNvPr>
           <p:cNvSpPr txBox="1"/>
           <p:nvPr/>
         </p:nvSpPr>
         <p:spPr>
           <a:xfrm>
-            <a:off x="14856113" y="31747685"/>
+            <a:off x="14856113" y="34373155"/>
             <a:ext cx="4589277" cy="1043568"/>
           </a:xfrm>
           <a:prstGeom prst="rect">
@@ -4069,14 +4667,20 @@
       </p:sp>
       <p:sp>
         <p:nvSpPr>
-          <p:cNvPr id="22" name="TextBox 22"/>
+          <p:cNvPr id="25" name="IntroductionBox">
+            <a:extLst>
+              <a:ext uri="{FF2B5EF4-FFF2-40B4-BE49-F238E27FC236}">
+                <a16:creationId xmlns:a16="http://schemas.microsoft.com/office/drawing/2014/main" id="{21F45556-9CE7-BFEE-227B-3211D2F97CF3}"/>
+              </a:ext>
+            </a:extLst>
+          </p:cNvPr>
           <p:cNvSpPr txBox="1"/>
           <p:nvPr/>
         </p:nvSpPr>
         <p:spPr>
           <a:xfrm>
             <a:off x="779939" y="8207132"/>
-            <a:ext cx="11986919" cy="6741910"/>
+            <a:ext cx="11986919" cy="7886390"/>
           </a:xfrm>
           <a:prstGeom prst="rect">
             <a:avLst/>
@@ -4094,7 +4698,7 @@
               </a:lnSpc>
             </a:pPr>
             <a:r>
-              <a:rPr lang="en-US" sz="3150" dirty="0">
+              <a:rPr lang="en-US" sz="3600" dirty="0">
                 <a:solidFill>
                   <a:srgbClr val="000000"/>
                 </a:solidFill>
@@ -4106,7 +4710,7 @@
               <a:t>Contrary to popular belief, Lorem Ipsum is not simply random text. It has roots in a piece of classical Latin literature from 45 BC, making it over 2000 years old. Richard McClintock, a Latin professor at Hampden-Sydney College in Virginia, looked up one of the more obscure Latin words, </a:t>
             </a:r>
             <a:r>
-              <a:rPr lang="en-US" sz="3150" dirty="0" err="1">
+              <a:rPr lang="en-US" sz="3600" dirty="0" err="1">
                 <a:solidFill>
                   <a:srgbClr val="000000"/>
                 </a:solidFill>
@@ -4118,7 +4722,7 @@
               <a:t>consectetur</a:t>
             </a:r>
             <a:r>
-              <a:rPr lang="en-US" sz="3150" dirty="0">
+              <a:rPr lang="en-US" sz="3600" dirty="0">
                 <a:solidFill>
                   <a:srgbClr val="000000"/>
                 </a:solidFill>
@@ -4130,7 +4734,7 @@
               <a:t>, from a Lorem Ipsum passage, and going through the cites of the word in classical literature, discovered the undoubtable source. Lorem Ipsum comes from sections 1.10.32 and 1.10.33 of "de </a:t>
             </a:r>
             <a:r>
-              <a:rPr lang="en-US" sz="3150" dirty="0" err="1">
+              <a:rPr lang="en-US" sz="3600" dirty="0" err="1">
                 <a:solidFill>
                   <a:srgbClr val="000000"/>
                 </a:solidFill>
@@ -4142,7 +4746,7 @@
               <a:t>Finibus</a:t>
             </a:r>
             <a:r>
-              <a:rPr lang="en-US" sz="3150" dirty="0">
+              <a:rPr lang="en-US" sz="3600" dirty="0">
                 <a:solidFill>
                   <a:srgbClr val="000000"/>
                 </a:solidFill>
@@ -4154,7 +4758,7 @@
               <a:t> </a:t>
             </a:r>
             <a:r>
-              <a:rPr lang="en-US" sz="3150" dirty="0" err="1">
+              <a:rPr lang="en-US" sz="3600" dirty="0" err="1">
                 <a:solidFill>
                   <a:srgbClr val="000000"/>
                 </a:solidFill>
@@ -4166,7 +4770,7 @@
               <a:t>Bonorum</a:t>
             </a:r>
             <a:r>
-              <a:rPr lang="en-US" sz="3150" dirty="0">
+              <a:rPr lang="en-US" sz="3600" dirty="0">
                 <a:solidFill>
                   <a:srgbClr val="000000"/>
                 </a:solidFill>
@@ -4178,7 +4782,7 @@
               <a:t> et </a:t>
             </a:r>
             <a:r>
-              <a:rPr lang="en-US" sz="3150" dirty="0" err="1">
+              <a:rPr lang="en-US" sz="3600" dirty="0" err="1">
                 <a:solidFill>
                   <a:srgbClr val="000000"/>
                 </a:solidFill>
@@ -4190,7 +4794,7 @@
               <a:t>Malorum</a:t>
             </a:r>
             <a:r>
-              <a:rPr lang="en-US" sz="3150" dirty="0">
+              <a:rPr lang="en-US" sz="3600" dirty="0">
                 <a:solidFill>
                   <a:srgbClr val="000000"/>
                 </a:solidFill>
@@ -4202,7 +4806,7 @@
               <a:t>" (The Extremes of Good and Evil) by Cicero, written in 45 BC. This book is a treatise on the theory of ethics, very popular during the Renaissance. The first line of Lorem Ipsum, "Lorem ipsum dolor sit </a:t>
             </a:r>
             <a:r>
-              <a:rPr lang="en-US" sz="3150" dirty="0" err="1">
+              <a:rPr lang="en-US" sz="3600" dirty="0" err="1">
                 <a:solidFill>
                   <a:srgbClr val="000000"/>
                 </a:solidFill>
@@ -4214,7 +4818,7 @@
               <a:t>amet</a:t>
             </a:r>
             <a:r>
-              <a:rPr lang="en-US" sz="3150" dirty="0">
+              <a:rPr lang="en-US" sz="3600" dirty="0">
                 <a:solidFill>
                   <a:srgbClr val="000000"/>
                 </a:solidFill>
@@ -4230,32 +4834,38 @@
       </p:sp>
       <p:sp>
         <p:nvSpPr>
-          <p:cNvPr id="23" name="TextBox 23"/>
+          <p:cNvPr id="26" name="ResultsBox">
+            <a:extLst>
+              <a:ext uri="{FF2B5EF4-FFF2-40B4-BE49-F238E27FC236}">
+                <a16:creationId xmlns:a16="http://schemas.microsoft.com/office/drawing/2014/main" id="{CE2F8D22-09D3-76C4-E553-D3D327EF59CD}"/>
+              </a:ext>
+            </a:extLst>
+          </p:cNvPr>
           <p:cNvSpPr txBox="1"/>
           <p:nvPr/>
         </p:nvSpPr>
         <p:spPr>
           <a:xfrm>
-            <a:off x="13357980" y="8207132"/>
-            <a:ext cx="16138081" cy="2227854"/>
+            <a:off x="13357981" y="8207132"/>
+            <a:ext cx="16138080" cy="3936590"/>
           </a:xfrm>
           <a:prstGeom prst="rect">
             <a:avLst/>
           </a:prstGeom>
         </p:spPr>
         <p:txBody>
-          <a:bodyPr lIns="0" tIns="0" rIns="0" bIns="0" rtlCol="0" anchor="t">
+          <a:bodyPr wrap="square" lIns="0" tIns="0" rIns="0" bIns="0" rtlCol="0" anchor="t">
             <a:spAutoFit/>
           </a:bodyPr>
           <a:lstStyle/>
           <a:p>
-            <a:pPr algn="l">
+            <a:pPr>
               <a:lnSpc>
                 <a:spcPts val="4409"/>
               </a:lnSpc>
             </a:pPr>
             <a:r>
-              <a:rPr lang="en-US" sz="3150" dirty="0">
+              <a:rPr lang="en-US" sz="3600" dirty="0">
                 <a:solidFill>
                   <a:srgbClr val="000000"/>
                 </a:solidFill>
@@ -4267,7 +4877,7 @@
               <a:t>Contrary to popular belief, Lorem Ipsum is not simply random text. It has roots in a piece of classical Latin literature from 45 BC, making it over 2000 years old. Richard McClintock, a Latin professor at Hampden-Sydney College in Virginia, looked up one of the more obscure Latin words, </a:t>
             </a:r>
             <a:r>
-              <a:rPr lang="en-US" sz="3150" dirty="0" err="1">
+              <a:rPr lang="en-US" sz="3600" dirty="0" err="1">
                 <a:solidFill>
                   <a:srgbClr val="000000"/>
                 </a:solidFill>
@@ -4279,7 +4889,7 @@
               <a:t>consectetur</a:t>
             </a:r>
             <a:r>
-              <a:rPr lang="en-US" sz="3150" dirty="0">
+              <a:rPr lang="en-US" sz="3600" dirty="0">
                 <a:solidFill>
                   <a:srgbClr val="000000"/>
                 </a:solidFill>
@@ -4288,20 +4898,98 @@
                 <a:cs typeface="Helvetica Now"/>
                 <a:sym typeface="Helvetica Now"/>
               </a:rPr>
-              <a:t>, from a Lorem Ipsum passage, and going through.</a:t>
-            </a:r>
-          </a:p>
-        </p:txBody>
-      </p:sp>
-      <p:sp>
-        <p:nvSpPr>
-          <p:cNvPr id="24" name="TextBox 24"/>
+              <a:t>, from a Lorem Ipsum passage, and going through the cites of the word in classical literature, discovered the undoubtable source. Lorem Ipsum comes from sections 1.10.32 and 1.10.33 of "de </a:t>
+            </a:r>
+            <a:r>
+              <a:rPr lang="en-US" sz="3600" dirty="0" err="1">
+                <a:solidFill>
+                  <a:srgbClr val="000000"/>
+                </a:solidFill>
+                <a:latin typeface="Aptos" panose="020B0004020202020204" pitchFamily="34" charset="0"/>
+                <a:ea typeface="Helvetica Now"/>
+                <a:cs typeface="Helvetica Now"/>
+                <a:sym typeface="Helvetica Now"/>
+              </a:rPr>
+              <a:t>Finibus</a:t>
+            </a:r>
+            <a:r>
+              <a:rPr lang="en-US" sz="3600" dirty="0">
+                <a:solidFill>
+                  <a:srgbClr val="000000"/>
+                </a:solidFill>
+                <a:latin typeface="Aptos" panose="020B0004020202020204" pitchFamily="34" charset="0"/>
+                <a:ea typeface="Helvetica Now"/>
+                <a:cs typeface="Helvetica Now"/>
+                <a:sym typeface="Helvetica Now"/>
+              </a:rPr>
+              <a:t> </a:t>
+            </a:r>
+            <a:r>
+              <a:rPr lang="en-US" sz="3600" dirty="0" err="1">
+                <a:solidFill>
+                  <a:srgbClr val="000000"/>
+                </a:solidFill>
+                <a:latin typeface="Aptos" panose="020B0004020202020204" pitchFamily="34" charset="0"/>
+                <a:ea typeface="Helvetica Now"/>
+                <a:cs typeface="Helvetica Now"/>
+                <a:sym typeface="Helvetica Now"/>
+              </a:rPr>
+              <a:t>Bonorum</a:t>
+            </a:r>
+            <a:r>
+              <a:rPr lang="en-US" sz="3600" dirty="0">
+                <a:solidFill>
+                  <a:srgbClr val="000000"/>
+                </a:solidFill>
+                <a:latin typeface="Aptos" panose="020B0004020202020204" pitchFamily="34" charset="0"/>
+                <a:ea typeface="Helvetica Now"/>
+                <a:cs typeface="Helvetica Now"/>
+                <a:sym typeface="Helvetica Now"/>
+              </a:rPr>
+              <a:t> et </a:t>
+            </a:r>
+            <a:r>
+              <a:rPr lang="en-US" sz="3600" dirty="0" err="1">
+                <a:solidFill>
+                  <a:srgbClr val="000000"/>
+                </a:solidFill>
+                <a:latin typeface="Aptos" panose="020B0004020202020204" pitchFamily="34" charset="0"/>
+                <a:ea typeface="Helvetica Now"/>
+                <a:cs typeface="Helvetica Now"/>
+                <a:sym typeface="Helvetica Now"/>
+              </a:rPr>
+              <a:t>Malorum</a:t>
+            </a:r>
+            <a:r>
+              <a:rPr lang="en-US" sz="3600" dirty="0">
+                <a:solidFill>
+                  <a:srgbClr val="000000"/>
+                </a:solidFill>
+                <a:latin typeface="Aptos" panose="020B0004020202020204" pitchFamily="34" charset="0"/>
+                <a:ea typeface="Helvetica Now"/>
+                <a:cs typeface="Helvetica Now"/>
+                <a:sym typeface="Helvetica Now"/>
+              </a:rPr>
+              <a:t>" (The Extremes of Good and Evil) by Cicero, </a:t>
+            </a:r>
+          </a:p>
+        </p:txBody>
+      </p:sp>
+      <p:sp>
+        <p:nvSpPr>
+          <p:cNvPr id="27" name="TextBox 24">
+            <a:extLst>
+              <a:ext uri="{FF2B5EF4-FFF2-40B4-BE49-F238E27FC236}">
+                <a16:creationId xmlns:a16="http://schemas.microsoft.com/office/drawing/2014/main" id="{54032261-4804-6FDD-8787-47BED1841AE7}"/>
+              </a:ext>
+            </a:extLst>
+          </p:cNvPr>
           <p:cNvSpPr txBox="1"/>
           <p:nvPr/>
         </p:nvSpPr>
         <p:spPr>
           <a:xfrm>
-            <a:off x="2278072" y="17863506"/>
+            <a:off x="2278072" y="16626355"/>
             <a:ext cx="4589277" cy="1043568"/>
           </a:xfrm>
           <a:prstGeom prst="rect">
@@ -4336,14 +5024,20 @@
       </p:sp>
       <p:sp>
         <p:nvSpPr>
-          <p:cNvPr id="25" name="TextBox 25"/>
+          <p:cNvPr id="28" name="MethodsBox">
+            <a:extLst>
+              <a:ext uri="{FF2B5EF4-FFF2-40B4-BE49-F238E27FC236}">
+                <a16:creationId xmlns:a16="http://schemas.microsoft.com/office/drawing/2014/main" id="{420CDE4F-FFA0-9065-F103-2F0EFE80E5CE}"/>
+              </a:ext>
+            </a:extLst>
+          </p:cNvPr>
           <p:cNvSpPr txBox="1"/>
           <p:nvPr/>
         </p:nvSpPr>
         <p:spPr>
           <a:xfrm>
-            <a:off x="779939" y="19571823"/>
-            <a:ext cx="11986919" cy="3356368"/>
+            <a:off x="779939" y="18334672"/>
+            <a:ext cx="11986919" cy="3936590"/>
           </a:xfrm>
           <a:prstGeom prst="rect">
             <a:avLst/>
@@ -4361,7 +5055,7 @@
               </a:lnSpc>
             </a:pPr>
             <a:r>
-              <a:rPr lang="en-US" sz="3150">
+              <a:rPr lang="en-US" sz="3600" dirty="0">
                 <a:solidFill>
                   <a:srgbClr val="000000"/>
                 </a:solidFill>
@@ -4370,39 +5064,69 @@
                 <a:cs typeface="Helvetica Now"/>
                 <a:sym typeface="Helvetica Now"/>
               </a:rPr>
-              <a:t>Contrary to popular belief, Lorem Ipsum is not simply random text. It has roots in a piece of classical Latin literature from 45 BC, making it over 2000 years old. Richard McClintock, a Latin professor at Hampden-Sydney College in Virginia, looked up one of the more obscure Latin words, consectetur, from a Lorem Ipsum passage, and going through the cites of the word </a:t>
-            </a:r>
-          </a:p>
-        </p:txBody>
-      </p:sp>
-      <p:sp>
-        <p:nvSpPr>
-          <p:cNvPr id="26" name="TextBox 26"/>
+              <a:t>Contrary to popular belief, Lorem Ipsum is not simply random text. It has roots in a piece of classical Latin literature from 45 BC, making it over 2000 years old. Richard McClintock, a Latin professor at Hampden-Sydney College in Virginia, looked up one of the more obscure Latin words, </a:t>
+            </a:r>
+            <a:r>
+              <a:rPr lang="en-US" sz="3600" dirty="0" err="1">
+                <a:solidFill>
+                  <a:srgbClr val="000000"/>
+                </a:solidFill>
+                <a:latin typeface="Aptos" panose="020B0004020202020204" pitchFamily="34" charset="0"/>
+                <a:ea typeface="Helvetica Now"/>
+                <a:cs typeface="Helvetica Now"/>
+                <a:sym typeface="Helvetica Now"/>
+              </a:rPr>
+              <a:t>consectetur</a:t>
+            </a:r>
+            <a:r>
+              <a:rPr lang="en-US" sz="3600" dirty="0">
+                <a:solidFill>
+                  <a:srgbClr val="000000"/>
+                </a:solidFill>
+                <a:latin typeface="Aptos" panose="020B0004020202020204" pitchFamily="34" charset="0"/>
+                <a:ea typeface="Helvetica Now"/>
+                <a:cs typeface="Helvetica Now"/>
+                <a:sym typeface="Helvetica Now"/>
+              </a:rPr>
+              <a:t>, from a Lorem Ipsum passage, and going through the cites of the word </a:t>
+            </a:r>
+          </a:p>
+        </p:txBody>
+      </p:sp>
+      <p:sp>
+        <p:nvSpPr>
+          <p:cNvPr id="29" name="FigureDesc1">
+            <a:extLst>
+              <a:ext uri="{FF2B5EF4-FFF2-40B4-BE49-F238E27FC236}">
+                <a16:creationId xmlns:a16="http://schemas.microsoft.com/office/drawing/2014/main" id="{F1DFCC17-6102-BF02-9092-D84ECCADAF11}"/>
+              </a:ext>
+            </a:extLst>
+          </p:cNvPr>
           <p:cNvSpPr txBox="1"/>
           <p:nvPr/>
         </p:nvSpPr>
         <p:spPr>
           <a:xfrm>
-            <a:off x="13930650" y="25328685"/>
-            <a:ext cx="2414699" cy="539115"/>
+            <a:off x="13597434" y="25121441"/>
+            <a:ext cx="15561765" cy="539115"/>
           </a:xfrm>
           <a:prstGeom prst="rect">
             <a:avLst/>
           </a:prstGeom>
         </p:spPr>
         <p:txBody>
-          <a:bodyPr lIns="0" tIns="0" rIns="0" bIns="0" rtlCol="0" anchor="t">
+          <a:bodyPr wrap="square" lIns="0" tIns="0" rIns="0" bIns="0" rtlCol="0" anchor="t">
             <a:spAutoFit/>
           </a:bodyPr>
           <a:lstStyle/>
           <a:p>
-            <a:pPr algn="l">
+            <a:pPr>
               <a:lnSpc>
                 <a:spcPts val="4409"/>
               </a:lnSpc>
             </a:pPr>
             <a:r>
-              <a:rPr lang="en-US" sz="3150">
+              <a:rPr lang="en-US" sz="3150" dirty="0">
                 <a:solidFill>
                   <a:srgbClr val="000000"/>
                 </a:solidFill>
@@ -4418,13 +5142,19 @@
       </p:sp>
       <p:sp>
         <p:nvSpPr>
-          <p:cNvPr id="27" name="TextBox 27"/>
+          <p:cNvPr id="30" name="TextBox 27">
+            <a:extLst>
+              <a:ext uri="{FF2B5EF4-FFF2-40B4-BE49-F238E27FC236}">
+                <a16:creationId xmlns:a16="http://schemas.microsoft.com/office/drawing/2014/main" id="{21DB21C6-5268-12A0-B9F1-052F57946DE1}"/>
+              </a:ext>
+            </a:extLst>
+          </p:cNvPr>
           <p:cNvSpPr txBox="1"/>
           <p:nvPr/>
         </p:nvSpPr>
         <p:spPr>
           <a:xfrm>
-            <a:off x="2278072" y="23952825"/>
+            <a:off x="2278072" y="24405457"/>
             <a:ext cx="9061559" cy="539115"/>
           </a:xfrm>
           <a:prstGeom prst="rect">
@@ -4459,13 +5189,19 @@
       </p:sp>
       <p:sp>
         <p:nvSpPr>
-          <p:cNvPr id="28" name="TextBox 28"/>
+          <p:cNvPr id="31" name="TextBox 28">
+            <a:extLst>
+              <a:ext uri="{FF2B5EF4-FFF2-40B4-BE49-F238E27FC236}">
+                <a16:creationId xmlns:a16="http://schemas.microsoft.com/office/drawing/2014/main" id="{01DD30E7-587C-AA16-A334-802C3CA7E1DB}"/>
+              </a:ext>
+            </a:extLst>
+          </p:cNvPr>
           <p:cNvSpPr txBox="1"/>
           <p:nvPr/>
         </p:nvSpPr>
         <p:spPr>
           <a:xfrm>
-            <a:off x="3376912" y="27632866"/>
+            <a:off x="3376912" y="28085498"/>
             <a:ext cx="6910559" cy="539115"/>
           </a:xfrm>
           <a:prstGeom prst="rect">
@@ -4500,13 +5236,19 @@
       </p:sp>
       <p:sp>
         <p:nvSpPr>
-          <p:cNvPr id="29" name="TextBox 29"/>
+          <p:cNvPr id="32" name="TextBox 29">
+            <a:extLst>
+              <a:ext uri="{FF2B5EF4-FFF2-40B4-BE49-F238E27FC236}">
+                <a16:creationId xmlns:a16="http://schemas.microsoft.com/office/drawing/2014/main" id="{F384489F-AA07-3B72-18B4-4CE5EEA0167C}"/>
+              </a:ext>
+            </a:extLst>
+          </p:cNvPr>
           <p:cNvSpPr txBox="1"/>
           <p:nvPr/>
         </p:nvSpPr>
         <p:spPr>
           <a:xfrm>
-            <a:off x="4303673" y="30796666"/>
+            <a:off x="4303673" y="31249298"/>
             <a:ext cx="5189759" cy="539115"/>
           </a:xfrm>
           <a:prstGeom prst="rect">
@@ -4541,13 +5283,19 @@
       </p:sp>
       <p:sp>
         <p:nvSpPr>
-          <p:cNvPr id="30" name="TextBox 30"/>
+          <p:cNvPr id="33" name="TextBox 30">
+            <a:extLst>
+              <a:ext uri="{FF2B5EF4-FFF2-40B4-BE49-F238E27FC236}">
+                <a16:creationId xmlns:a16="http://schemas.microsoft.com/office/drawing/2014/main" id="{3D3071DB-0ACA-EA8F-4DE2-3D684E6448BB}"/>
+              </a:ext>
+            </a:extLst>
+          </p:cNvPr>
           <p:cNvSpPr txBox="1"/>
           <p:nvPr/>
         </p:nvSpPr>
         <p:spPr>
           <a:xfrm>
-            <a:off x="4972313" y="33229126"/>
+            <a:off x="4972313" y="33681758"/>
             <a:ext cx="3856138" cy="539115"/>
           </a:xfrm>
           <a:prstGeom prst="rect">
@@ -4582,14 +5330,20 @@
       </p:sp>
       <p:sp>
         <p:nvSpPr>
-          <p:cNvPr id="31" name="TextBox 31"/>
+          <p:cNvPr id="34" name="ConclusionBox">
+            <a:extLst>
+              <a:ext uri="{FF2B5EF4-FFF2-40B4-BE49-F238E27FC236}">
+                <a16:creationId xmlns:a16="http://schemas.microsoft.com/office/drawing/2014/main" id="{30C29C4B-9858-3960-85D8-D6A2A020B75F}"/>
+              </a:ext>
+            </a:extLst>
+          </p:cNvPr>
           <p:cNvSpPr txBox="1"/>
           <p:nvPr/>
         </p:nvSpPr>
         <p:spPr>
           <a:xfrm>
-            <a:off x="13357980" y="27869086"/>
-            <a:ext cx="16138081" cy="2227854"/>
+            <a:off x="13357980" y="36081471"/>
+            <a:ext cx="16138081" cy="2808076"/>
           </a:xfrm>
           <a:prstGeom prst="rect">
             <a:avLst/>
@@ -4607,48 +5361,7 @@
               </a:lnSpc>
             </a:pPr>
             <a:r>
-              <a:rPr lang="en-US" sz="3150">
-                <a:solidFill>
-                  <a:srgbClr val="000000"/>
-                </a:solidFill>
-                <a:latin typeface="Aptos" panose="020B0004020202020204" pitchFamily="34" charset="0"/>
-                <a:ea typeface="Helvetica Now"/>
-                <a:cs typeface="Helvetica Now"/>
-                <a:sym typeface="Helvetica Now"/>
-              </a:rPr>
-              <a:t>Contrary to popular belief, Lorem Ipsum is not simply random text. It has roots in a piece of classical Latin literature from 45 BC, making it over 2000 years old. Richard McClintock, a Latin professor at Hampden-Sydney College in Virginia, looked up one of the more obscure Latin words, consectetur, from a Lorem Ipsum passage, and going throug</a:t>
-            </a:r>
-          </a:p>
-        </p:txBody>
-      </p:sp>
-      <p:sp>
-        <p:nvSpPr>
-          <p:cNvPr id="32" name="TextBox 32"/>
-          <p:cNvSpPr txBox="1"/>
-          <p:nvPr/>
-        </p:nvSpPr>
-        <p:spPr>
-          <a:xfrm>
-            <a:off x="13357980" y="33456001"/>
-            <a:ext cx="16138081" cy="5049139"/>
-          </a:xfrm>
-          <a:prstGeom prst="rect">
-            <a:avLst/>
-          </a:prstGeom>
-        </p:spPr>
-        <p:txBody>
-          <a:bodyPr lIns="0" tIns="0" rIns="0" bIns="0" rtlCol="0" anchor="t">
-            <a:spAutoFit/>
-          </a:bodyPr>
-          <a:lstStyle/>
-          <a:p>
-            <a:pPr algn="l">
-              <a:lnSpc>
-                <a:spcPts val="4409"/>
-              </a:lnSpc>
-            </a:pPr>
-            <a:r>
-              <a:rPr lang="en-US" sz="3150" dirty="0">
+              <a:rPr lang="en-US" sz="3600" dirty="0">
                 <a:solidFill>
                   <a:srgbClr val="000000"/>
                 </a:solidFill>
@@ -4660,7 +5373,7 @@
               <a:t>Contrary to popular belief, Lorem Ipsum is not simply random text. It has roots in a piece of classical Latin literature from 45 BC, making it over 2000 years old. Richard McClintock, a Latin professor at Hampden-Sydney College in Virginia, looked up one of the more obscure Latin words, </a:t>
             </a:r>
             <a:r>
-              <a:rPr lang="en-US" sz="3150" dirty="0" err="1">
+              <a:rPr lang="en-US" sz="3600" dirty="0" err="1">
                 <a:solidFill>
                   <a:srgbClr val="000000"/>
                 </a:solidFill>
@@ -4672,7 +5385,7 @@
               <a:t>consectetur</a:t>
             </a:r>
             <a:r>
-              <a:rPr lang="en-US" sz="3150" dirty="0">
+              <a:rPr lang="en-US" sz="3600" dirty="0">
                 <a:solidFill>
                   <a:srgbClr val="000000"/>
                 </a:solidFill>
@@ -4681,10 +5394,45 @@
                 <a:cs typeface="Helvetica Now"/>
                 <a:sym typeface="Helvetica Now"/>
               </a:rPr>
-              <a:t>, from a Lorem Ipsum passage, and going through the cites of the word in classical literature, discovered the undoubtable source. Lorem Ipsum comes from sections 1.10.32 and 1.10.33 of "de </a:t>
-            </a:r>
-            <a:r>
-              <a:rPr lang="en-US" sz="3150" dirty="0" err="1">
+              <a:t>, from a Lorem Ipsum passage, and going through the cites of the word in classical literature, discovered</a:t>
+            </a:r>
+          </a:p>
+        </p:txBody>
+      </p:sp>
+      <p:sp>
+        <p:nvSpPr>
+          <p:cNvPr id="35" name="ReferencesBox">
+            <a:extLst>
+              <a:ext uri="{FF2B5EF4-FFF2-40B4-BE49-F238E27FC236}">
+                <a16:creationId xmlns:a16="http://schemas.microsoft.com/office/drawing/2014/main" id="{F9107819-BBE3-3408-D73E-35FE7791A8D8}"/>
+              </a:ext>
+            </a:extLst>
+          </p:cNvPr>
+          <p:cNvSpPr txBox="1"/>
+          <p:nvPr/>
+        </p:nvSpPr>
+        <p:spPr>
+          <a:xfrm>
+            <a:off x="1070598" y="39716504"/>
+            <a:ext cx="25258322" cy="1651158"/>
+          </a:xfrm>
+          <a:prstGeom prst="rect">
+            <a:avLst/>
+          </a:prstGeom>
+        </p:spPr>
+        <p:txBody>
+          <a:bodyPr lIns="0" tIns="0" rIns="0" bIns="0" rtlCol="0" anchor="t">
+            <a:spAutoFit/>
+          </a:bodyPr>
+          <a:lstStyle/>
+          <a:p>
+            <a:pPr algn="l">
+              <a:lnSpc>
+                <a:spcPts val="4409"/>
+              </a:lnSpc>
+            </a:pPr>
+            <a:r>
+              <a:rPr lang="en-US" sz="3200" dirty="0">
                 <a:solidFill>
                   <a:srgbClr val="000000"/>
                 </a:solidFill>
@@ -4693,10 +5441,10 @@
                 <a:cs typeface="Helvetica Now"/>
                 <a:sym typeface="Helvetica Now"/>
               </a:rPr>
-              <a:t>Finibus</a:t>
-            </a:r>
-            <a:r>
-              <a:rPr lang="en-US" sz="3150" dirty="0">
+              <a:t>Contrary to popular belief, Lorem Ipsum is not simply random text. It has roots in a piece of classical Latin literature from 45 BC, making it over 2000 years old. Richard McClintock, a Latin professor at Hampden-Sydney College in Virginia, looked up one of the more obscure Latin words, </a:t>
+            </a:r>
+            <a:r>
+              <a:rPr lang="en-US" sz="3200" dirty="0" err="1">
                 <a:solidFill>
                   <a:srgbClr val="000000"/>
                 </a:solidFill>
@@ -4705,10 +5453,10 @@
                 <a:cs typeface="Helvetica Now"/>
                 <a:sym typeface="Helvetica Now"/>
               </a:rPr>
-              <a:t> </a:t>
-            </a:r>
-            <a:r>
-              <a:rPr lang="en-US" sz="3150" dirty="0" err="1">
+              <a:t>consectetur</a:t>
+            </a:r>
+            <a:r>
+              <a:rPr lang="en-US" sz="3200" dirty="0">
                 <a:solidFill>
                   <a:srgbClr val="000000"/>
                 </a:solidFill>
@@ -4717,10 +5465,10 @@
                 <a:cs typeface="Helvetica Now"/>
                 <a:sym typeface="Helvetica Now"/>
               </a:rPr>
-              <a:t>Bonorum</a:t>
-            </a:r>
-            <a:r>
-              <a:rPr lang="en-US" sz="3150" dirty="0">
+              <a:t>, from a Lorem Ipsum passage, and going </a:t>
+            </a:r>
+            <a:r>
+              <a:rPr lang="en-US" sz="3200" dirty="0" err="1">
                 <a:solidFill>
                   <a:srgbClr val="000000"/>
                 </a:solidFill>
@@ -4729,101 +5477,494 @@
                 <a:cs typeface="Helvetica Now"/>
                 <a:sym typeface="Helvetica Now"/>
               </a:rPr>
-              <a:t> et </a:t>
-            </a:r>
-            <a:r>
-              <a:rPr lang="en-US" sz="3150" dirty="0" err="1">
-                <a:solidFill>
-                  <a:srgbClr val="000000"/>
-                </a:solidFill>
-                <a:latin typeface="Aptos" panose="020B0004020202020204" pitchFamily="34" charset="0"/>
-                <a:ea typeface="Helvetica Now"/>
-                <a:cs typeface="Helvetica Now"/>
-                <a:sym typeface="Helvetica Now"/>
-              </a:rPr>
-              <a:t>Malorum</a:t>
-            </a:r>
-            <a:r>
-              <a:rPr lang="en-US" sz="3150" dirty="0">
-                <a:solidFill>
-                  <a:srgbClr val="000000"/>
-                </a:solidFill>
-                <a:latin typeface="Aptos" panose="020B0004020202020204" pitchFamily="34" charset="0"/>
-                <a:ea typeface="Helvetica Now"/>
-                <a:cs typeface="Helvetica Now"/>
-                <a:sym typeface="Helvetica Now"/>
-              </a:rPr>
-              <a:t>" (The Extremes of Good and Evil) by Cicero, written in 45 BC. This book is a treatise on the theory of ethics, very popular during the Renaissance. The first line of Lorem Ipsum, "Lorem ipsum dolor sit </a:t>
-            </a:r>
-            <a:r>
-              <a:rPr lang="en-US" sz="3150" dirty="0" err="1">
-                <a:solidFill>
-                  <a:srgbClr val="000000"/>
-                </a:solidFill>
-                <a:latin typeface="Aptos" panose="020B0004020202020204" pitchFamily="34" charset="0"/>
-                <a:ea typeface="Helvetica Now"/>
-                <a:cs typeface="Helvetica Now"/>
-                <a:sym typeface="Helvetica Now"/>
-              </a:rPr>
-              <a:t>amet</a:t>
-            </a:r>
-            <a:r>
-              <a:rPr lang="en-US" sz="3150" dirty="0">
-                <a:solidFill>
-                  <a:srgbClr val="000000"/>
-                </a:solidFill>
-                <a:latin typeface="Aptos" panose="020B0004020202020204" pitchFamily="34" charset="0"/>
-                <a:ea typeface="Helvetica Now"/>
-                <a:cs typeface="Helvetica Now"/>
-                <a:sym typeface="Helvetica Now"/>
-              </a:rPr>
-              <a:t>..", comes from a line in section 1.10.32.</a:t>
-            </a:r>
-          </a:p>
-        </p:txBody>
-      </p:sp>
-      <p:sp>
-        <p:nvSpPr>
-          <p:cNvPr id="33" name="TextBox 33"/>
+              <a:t>throug</a:t>
+            </a:r>
+            <a:endParaRPr lang="en-US" sz="3200" dirty="0">
+              <a:solidFill>
+                <a:srgbClr val="000000"/>
+              </a:solidFill>
+              <a:latin typeface="Aptos" panose="020B0004020202020204" pitchFamily="34" charset="0"/>
+              <a:ea typeface="Helvetica Now"/>
+              <a:cs typeface="Helvetica Now"/>
+              <a:sym typeface="Helvetica Now"/>
+            </a:endParaRPr>
+          </a:p>
+        </p:txBody>
+      </p:sp>
+      <p:grpSp>
+        <p:nvGrpSpPr>
+          <p:cNvPr id="36" name="Group 6">
+            <a:extLst>
+              <a:ext uri="{FF2B5EF4-FFF2-40B4-BE49-F238E27FC236}">
+                <a16:creationId xmlns:a16="http://schemas.microsoft.com/office/drawing/2014/main" id="{0757FACC-BCBC-6919-6716-03BB351D01FD}"/>
+              </a:ext>
+            </a:extLst>
+          </p:cNvPr>
+          <p:cNvGrpSpPr/>
+          <p:nvPr/>
+        </p:nvGrpSpPr>
+        <p:grpSpPr>
+          <a:xfrm>
+            <a:off x="13357980" y="26618795"/>
+            <a:ext cx="7800220" cy="6711014"/>
+            <a:chOff x="0" y="0"/>
+            <a:chExt cx="1444162" cy="1444162"/>
+          </a:xfrm>
+        </p:grpSpPr>
+        <p:sp>
+          <p:nvSpPr>
+            <p:cNvPr id="37" name="Freeform 7">
+              <a:extLst>
+                <a:ext uri="{FF2B5EF4-FFF2-40B4-BE49-F238E27FC236}">
+                  <a16:creationId xmlns:a16="http://schemas.microsoft.com/office/drawing/2014/main" id="{9ABFCC7E-9034-CA23-3726-9855C842CFE2}"/>
+                </a:ext>
+              </a:extLst>
+            </p:cNvPr>
+            <p:cNvSpPr/>
+            <p:nvPr/>
+          </p:nvSpPr>
+          <p:spPr>
+            <a:xfrm>
+              <a:off x="0" y="0"/>
+              <a:ext cx="1444162" cy="1444162"/>
+            </a:xfrm>
+            <a:custGeom>
+              <a:avLst/>
+              <a:gdLst/>
+              <a:ahLst/>
+              <a:cxnLst/>
+              <a:rect l="l" t="t" r="r" b="b"/>
+              <a:pathLst>
+                <a:path w="1444162" h="1444162">
+                  <a:moveTo>
+                    <a:pt x="23986" y="0"/>
+                  </a:moveTo>
+                  <a:lnTo>
+                    <a:pt x="1420175" y="0"/>
+                  </a:lnTo>
+                  <a:cubicBezTo>
+                    <a:pt x="1433423" y="0"/>
+                    <a:pt x="1444162" y="10739"/>
+                    <a:pt x="1444162" y="23986"/>
+                  </a:cubicBezTo>
+                  <a:lnTo>
+                    <a:pt x="1444162" y="1420175"/>
+                  </a:lnTo>
+                  <a:cubicBezTo>
+                    <a:pt x="1444162" y="1433423"/>
+                    <a:pt x="1433423" y="1444162"/>
+                    <a:pt x="1420175" y="1444162"/>
+                  </a:cubicBezTo>
+                  <a:lnTo>
+                    <a:pt x="23986" y="1444162"/>
+                  </a:lnTo>
+                  <a:cubicBezTo>
+                    <a:pt x="10739" y="1444162"/>
+                    <a:pt x="0" y="1433423"/>
+                    <a:pt x="0" y="1420175"/>
+                  </a:cubicBezTo>
+                  <a:lnTo>
+                    <a:pt x="0" y="23986"/>
+                  </a:lnTo>
+                  <a:cubicBezTo>
+                    <a:pt x="0" y="10739"/>
+                    <a:pt x="10739" y="0"/>
+                    <a:pt x="23986" y="0"/>
+                  </a:cubicBezTo>
+                  <a:close/>
+                </a:path>
+              </a:pathLst>
+            </a:custGeom>
+            <a:solidFill>
+              <a:srgbClr val="FFFFFF"/>
+            </a:solidFill>
+          </p:spPr>
+          <p:txBody>
+            <a:bodyPr/>
+            <a:lstStyle/>
+            <a:p>
+              <a:endParaRPr lang="en-GB"/>
+            </a:p>
+          </p:txBody>
+        </p:sp>
+        <p:sp>
+          <p:nvSpPr>
+            <p:cNvPr id="38" name="TextBox 8">
+              <a:extLst>
+                <a:ext uri="{FF2B5EF4-FFF2-40B4-BE49-F238E27FC236}">
+                  <a16:creationId xmlns:a16="http://schemas.microsoft.com/office/drawing/2014/main" id="{8A69A7AE-2EA2-3940-62FD-5B964CF2CCCD}"/>
+                </a:ext>
+              </a:extLst>
+            </p:cNvPr>
+            <p:cNvSpPr txBox="1"/>
+            <p:nvPr/>
+          </p:nvSpPr>
+          <p:spPr>
+            <a:xfrm>
+              <a:off x="0" y="-123825"/>
+              <a:ext cx="1444162" cy="1567987"/>
+            </a:xfrm>
+            <a:prstGeom prst="rect">
+              <a:avLst/>
+            </a:prstGeom>
+          </p:spPr>
+          <p:txBody>
+            <a:bodyPr lIns="50800" tIns="50800" rIns="50800" bIns="50800" rtlCol="0" anchor="ctr"/>
+            <a:lstStyle/>
+            <a:p>
+              <a:pPr algn="ctr">
+                <a:lnSpc>
+                  <a:spcPts val="9799"/>
+                </a:lnSpc>
+              </a:pPr>
+              <a:r>
+                <a:rPr lang="en-US" sz="6999">
+                  <a:solidFill>
+                    <a:srgbClr val="FFFFFF"/>
+                  </a:solidFill>
+                  <a:latin typeface="Helvetica Now"/>
+                  <a:ea typeface="Helvetica Now"/>
+                  <a:cs typeface="Helvetica Now"/>
+                  <a:sym typeface="Helvetica Now"/>
+                </a:rPr>
+                <a:t>Main</a:t>
+              </a:r>
+            </a:p>
+          </p:txBody>
+        </p:sp>
+      </p:grpSp>
+      <p:grpSp>
+        <p:nvGrpSpPr>
+          <p:cNvPr id="39" name="Group 6">
+            <a:extLst>
+              <a:ext uri="{FF2B5EF4-FFF2-40B4-BE49-F238E27FC236}">
+                <a16:creationId xmlns:a16="http://schemas.microsoft.com/office/drawing/2014/main" id="{2AF5DBE1-3709-3BF1-8FDE-01647D30B13B}"/>
+              </a:ext>
+            </a:extLst>
+          </p:cNvPr>
+          <p:cNvGrpSpPr/>
+          <p:nvPr/>
+        </p:nvGrpSpPr>
+        <p:grpSpPr>
+          <a:xfrm>
+            <a:off x="21695841" y="26618795"/>
+            <a:ext cx="7800220" cy="6711014"/>
+            <a:chOff x="0" y="0"/>
+            <a:chExt cx="1444162" cy="1444162"/>
+          </a:xfrm>
+        </p:grpSpPr>
+        <p:sp>
+          <p:nvSpPr>
+            <p:cNvPr id="40" name="Freeform 7">
+              <a:extLst>
+                <a:ext uri="{FF2B5EF4-FFF2-40B4-BE49-F238E27FC236}">
+                  <a16:creationId xmlns:a16="http://schemas.microsoft.com/office/drawing/2014/main" id="{C771F9CE-8055-634B-318C-080BFED2DCD0}"/>
+                </a:ext>
+              </a:extLst>
+            </p:cNvPr>
+            <p:cNvSpPr/>
+            <p:nvPr/>
+          </p:nvSpPr>
+          <p:spPr>
+            <a:xfrm>
+              <a:off x="0" y="0"/>
+              <a:ext cx="1444162" cy="1444162"/>
+            </a:xfrm>
+            <a:custGeom>
+              <a:avLst/>
+              <a:gdLst/>
+              <a:ahLst/>
+              <a:cxnLst/>
+              <a:rect l="l" t="t" r="r" b="b"/>
+              <a:pathLst>
+                <a:path w="1444162" h="1444162">
+                  <a:moveTo>
+                    <a:pt x="23986" y="0"/>
+                  </a:moveTo>
+                  <a:lnTo>
+                    <a:pt x="1420175" y="0"/>
+                  </a:lnTo>
+                  <a:cubicBezTo>
+                    <a:pt x="1433423" y="0"/>
+                    <a:pt x="1444162" y="10739"/>
+                    <a:pt x="1444162" y="23986"/>
+                  </a:cubicBezTo>
+                  <a:lnTo>
+                    <a:pt x="1444162" y="1420175"/>
+                  </a:lnTo>
+                  <a:cubicBezTo>
+                    <a:pt x="1444162" y="1433423"/>
+                    <a:pt x="1433423" y="1444162"/>
+                    <a:pt x="1420175" y="1444162"/>
+                  </a:cubicBezTo>
+                  <a:lnTo>
+                    <a:pt x="23986" y="1444162"/>
+                  </a:lnTo>
+                  <a:cubicBezTo>
+                    <a:pt x="10739" y="1444162"/>
+                    <a:pt x="0" y="1433423"/>
+                    <a:pt x="0" y="1420175"/>
+                  </a:cubicBezTo>
+                  <a:lnTo>
+                    <a:pt x="0" y="23986"/>
+                  </a:lnTo>
+                  <a:cubicBezTo>
+                    <a:pt x="0" y="10739"/>
+                    <a:pt x="10739" y="0"/>
+                    <a:pt x="23986" y="0"/>
+                  </a:cubicBezTo>
+                  <a:close/>
+                </a:path>
+              </a:pathLst>
+            </a:custGeom>
+            <a:solidFill>
+              <a:srgbClr val="FFFFFF"/>
+            </a:solidFill>
+          </p:spPr>
+          <p:txBody>
+            <a:bodyPr/>
+            <a:lstStyle/>
+            <a:p>
+              <a:endParaRPr lang="en-GB"/>
+            </a:p>
+          </p:txBody>
+        </p:sp>
+        <p:sp>
+          <p:nvSpPr>
+            <p:cNvPr id="41" name="TextBox 8">
+              <a:extLst>
+                <a:ext uri="{FF2B5EF4-FFF2-40B4-BE49-F238E27FC236}">
+                  <a16:creationId xmlns:a16="http://schemas.microsoft.com/office/drawing/2014/main" id="{D54C550A-6222-6FB5-E54B-88623039F583}"/>
+                </a:ext>
+              </a:extLst>
+            </p:cNvPr>
+            <p:cNvSpPr txBox="1"/>
+            <p:nvPr/>
+          </p:nvSpPr>
+          <p:spPr>
+            <a:xfrm>
+              <a:off x="0" y="-123825"/>
+              <a:ext cx="1444162" cy="1567987"/>
+            </a:xfrm>
+            <a:prstGeom prst="rect">
+              <a:avLst/>
+            </a:prstGeom>
+          </p:spPr>
+          <p:txBody>
+            <a:bodyPr lIns="50800" tIns="50800" rIns="50800" bIns="50800" rtlCol="0" anchor="ctr"/>
+            <a:lstStyle/>
+            <a:p>
+              <a:pPr algn="ctr">
+                <a:lnSpc>
+                  <a:spcPts val="9799"/>
+                </a:lnSpc>
+              </a:pPr>
+              <a:r>
+                <a:rPr lang="en-US" sz="6999">
+                  <a:solidFill>
+                    <a:srgbClr val="FFFFFF"/>
+                  </a:solidFill>
+                  <a:latin typeface="Helvetica Now"/>
+                  <a:ea typeface="Helvetica Now"/>
+                  <a:cs typeface="Helvetica Now"/>
+                  <a:sym typeface="Helvetica Now"/>
+                </a:rPr>
+                <a:t>Main</a:t>
+              </a:r>
+            </a:p>
+          </p:txBody>
+        </p:sp>
+      </p:grpSp>
+      <p:sp>
+        <p:nvSpPr>
+          <p:cNvPr id="42" name="FigureDesc2">
+            <a:extLst>
+              <a:ext uri="{FF2B5EF4-FFF2-40B4-BE49-F238E27FC236}">
+                <a16:creationId xmlns:a16="http://schemas.microsoft.com/office/drawing/2014/main" id="{29DB027E-82E7-59BB-90EF-0E16A01EBE91}"/>
+              </a:ext>
+            </a:extLst>
+          </p:cNvPr>
           <p:cNvSpPr txBox="1"/>
           <p:nvPr/>
         </p:nvSpPr>
         <p:spPr>
           <a:xfrm>
-            <a:off x="1070598" y="39716504"/>
-            <a:ext cx="25258322" cy="1663597"/>
+            <a:off x="13550587" y="32163081"/>
+            <a:ext cx="7364515" cy="539115"/>
           </a:xfrm>
           <a:prstGeom prst="rect">
             <a:avLst/>
           </a:prstGeom>
         </p:spPr>
         <p:txBody>
-          <a:bodyPr lIns="0" tIns="0" rIns="0" bIns="0" rtlCol="0" anchor="t">
+          <a:bodyPr wrap="square" lIns="0" tIns="0" rIns="0" bIns="0" rtlCol="0" anchor="t">
             <a:spAutoFit/>
           </a:bodyPr>
           <a:lstStyle/>
           <a:p>
-            <a:pPr algn="l">
+            <a:pPr>
               <a:lnSpc>
                 <a:spcPts val="4409"/>
               </a:lnSpc>
             </a:pPr>
             <a:r>
-              <a:rPr lang="en-US" sz="3150">
+              <a:rPr lang="en-US" sz="3150" dirty="0">
                 <a:solidFill>
                   <a:srgbClr val="000000"/>
                 </a:solidFill>
-                <a:latin typeface="Aptos" panose="020B0004020202020204" pitchFamily="34" charset="0"/>
+                <a:latin typeface="Helvetica Now"/>
                 <a:ea typeface="Helvetica Now"/>
                 <a:cs typeface="Helvetica Now"/>
                 <a:sym typeface="Helvetica Now"/>
               </a:rPr>
-              <a:t>Contrary to popular belief, Lorem Ipsum is not simply random text. It has roots in a piece of classical Latin literature from 45 BC, making it over 2000 years old. Richard McClintock, a Latin professor at Hampden-Sydney College in Virginia, looked up one of the more obscure Latin words, consectetur, from a Lorem Ipsum passage, and going throug</a:t>
-            </a:r>
+              <a:t>Figure 2:</a:t>
+            </a:r>
+          </a:p>
+        </p:txBody>
+      </p:sp>
+      <p:sp>
+        <p:nvSpPr>
+          <p:cNvPr id="43" name="FigureDesc3">
+            <a:extLst>
+              <a:ext uri="{FF2B5EF4-FFF2-40B4-BE49-F238E27FC236}">
+                <a16:creationId xmlns:a16="http://schemas.microsoft.com/office/drawing/2014/main" id="{0EE9E92C-9370-C63C-860B-91C66E7C6835}"/>
+              </a:ext>
+            </a:extLst>
+          </p:cNvPr>
+          <p:cNvSpPr txBox="1"/>
+          <p:nvPr/>
+        </p:nvSpPr>
+        <p:spPr>
+          <a:xfrm>
+            <a:off x="21935918" y="32163081"/>
+            <a:ext cx="7248681" cy="539115"/>
+          </a:xfrm>
+          <a:prstGeom prst="rect">
+            <a:avLst/>
+          </a:prstGeom>
+        </p:spPr>
+        <p:txBody>
+          <a:bodyPr wrap="square" lIns="0" tIns="0" rIns="0" bIns="0" rtlCol="0" anchor="t">
+            <a:spAutoFit/>
+          </a:bodyPr>
+          <a:lstStyle/>
+          <a:p>
+            <a:pPr>
+              <a:lnSpc>
+                <a:spcPts val="4409"/>
+              </a:lnSpc>
+            </a:pPr>
+            <a:r>
+              <a:rPr lang="en-US" sz="3150" dirty="0">
+                <a:solidFill>
+                  <a:srgbClr val="000000"/>
+                </a:solidFill>
+                <a:latin typeface="Helvetica Now"/>
+                <a:ea typeface="Helvetica Now"/>
+                <a:cs typeface="Helvetica Now"/>
+                <a:sym typeface="Helvetica Now"/>
+              </a:rPr>
+              <a:t>Figure 3:</a:t>
+            </a:r>
+          </a:p>
+        </p:txBody>
+      </p:sp>
+      <p:sp>
+        <p:nvSpPr>
+          <p:cNvPr id="4" name="Fig3Placeholder">
+            <a:extLst>
+              <a:ext uri="{FF2B5EF4-FFF2-40B4-BE49-F238E27FC236}">
+                <a16:creationId xmlns:a16="http://schemas.microsoft.com/office/drawing/2014/main" id="{C9E777CD-9360-806E-A4AC-EE0E47DA766F}"/>
+              </a:ext>
+            </a:extLst>
+          </p:cNvPr>
+          <p:cNvSpPr>
+            <a:spLocks noGrp="1"/>
+          </p:cNvSpPr>
+          <p:nvPr>
+            <p:ph type="pic" sz="quarter" idx="15"/>
+          </p:nvPr>
+        </p:nvSpPr>
+        <p:spPr>
+          <a:xfrm>
+            <a:off x="21910518" y="26810165"/>
+            <a:ext cx="7248681" cy="5223637"/>
+          </a:xfrm>
+        </p:spPr>
+        <p:txBody>
+          <a:bodyPr/>
+          <a:lstStyle/>
+          <a:p>
+            <a:endParaRPr lang="en-GB"/>
+          </a:p>
+        </p:txBody>
+      </p:sp>
+      <p:sp>
+        <p:nvSpPr>
+          <p:cNvPr id="3" name="Fig2Placeholder">
+            <a:extLst>
+              <a:ext uri="{FF2B5EF4-FFF2-40B4-BE49-F238E27FC236}">
+                <a16:creationId xmlns:a16="http://schemas.microsoft.com/office/drawing/2014/main" id="{03297ABF-617D-3140-8E42-431A3816DF14}"/>
+              </a:ext>
+            </a:extLst>
+          </p:cNvPr>
+          <p:cNvSpPr>
+            <a:spLocks noGrp="1"/>
+          </p:cNvSpPr>
+          <p:nvPr>
+            <p:ph type="pic" sz="quarter" idx="14"/>
+          </p:nvPr>
+        </p:nvSpPr>
+        <p:spPr>
+          <a:xfrm>
+            <a:off x="13550587" y="26810165"/>
+            <a:ext cx="7364515" cy="5223637"/>
+          </a:xfrm>
+        </p:spPr>
+        <p:txBody>
+          <a:bodyPr/>
+          <a:lstStyle/>
+          <a:p>
+            <a:endParaRPr lang="en-GB"/>
+          </a:p>
+        </p:txBody>
+      </p:sp>
+      <p:sp>
+        <p:nvSpPr>
+          <p:cNvPr id="2" name="Fig1Placeholder">
+            <a:extLst>
+              <a:ext uri="{FF2B5EF4-FFF2-40B4-BE49-F238E27FC236}">
+                <a16:creationId xmlns:a16="http://schemas.microsoft.com/office/drawing/2014/main" id="{3F3DE413-E45C-8B53-E3A4-23B0372051CF}"/>
+              </a:ext>
+            </a:extLst>
+          </p:cNvPr>
+          <p:cNvSpPr>
+            <a:spLocks noGrp="1"/>
+          </p:cNvSpPr>
+          <p:nvPr>
+            <p:ph type="pic" sz="quarter" idx="13"/>
+          </p:nvPr>
+        </p:nvSpPr>
+        <p:spPr>
+          <a:xfrm>
+            <a:off x="13597434" y="13328507"/>
+            <a:ext cx="15561765" cy="11616065"/>
+          </a:xfrm>
+        </p:spPr>
+        <p:txBody>
+          <a:bodyPr/>
+          <a:lstStyle/>
+          <a:p>
+            <a:endParaRPr lang="en-GB"/>
           </a:p>
         </p:txBody>
       </p:sp>
     </p:spTree>
+    <p:extLst>
+      <p:ext uri="{BB962C8B-B14F-4D97-AF65-F5344CB8AC3E}">
+        <p14:creationId xmlns:p14="http://schemas.microsoft.com/office/powerpoint/2010/main" val="1179720046"/>
+      </p:ext>
+    </p:extLst>
   </p:cSld>
   <p:clrMapOvr>
     <a:masterClrMapping/>

</xml_diff>